<commit_message>
push the projects as of now 2025.01.10
</commit_message>
<xml_diff>
--- a/cas_deepL_project/Eurosat_Image_Classification_Project.pptx
+++ b/cas_deepL_project/Eurosat_Image_Classification_Project.pptx
@@ -312,7 +312,7 @@
             <a:fld id="{B61BEF0D-F0BB-DE4B-95CE-6DB70DBA9567}" type="datetimeFigureOut">
               <a:rPr lang="en-US" dirty="0"/>
               <a:pPr/>
-              <a:t>1/6/2025</a:t>
+              <a:t>1/7/2025</a:t>
             </a:fld>
             <a:endParaRPr lang="en-US" dirty="0"/>
           </a:p>
@@ -745,7 +745,7 @@
             <a:fld id="{B61BEF0D-F0BB-DE4B-95CE-6DB70DBA9567}" type="datetimeFigureOut">
               <a:rPr lang="en-US" dirty="0"/>
               <a:pPr/>
-              <a:t>1/6/2025</a:t>
+              <a:t>1/7/2025</a:t>
             </a:fld>
             <a:endParaRPr lang="en-US" dirty="0"/>
           </a:p>
@@ -992,7 +992,7 @@
             <a:fld id="{B61BEF0D-F0BB-DE4B-95CE-6DB70DBA9567}" type="datetimeFigureOut">
               <a:rPr lang="en-US" dirty="0"/>
               <a:pPr/>
-              <a:t>1/6/2025</a:t>
+              <a:t>1/7/2025</a:t>
             </a:fld>
             <a:endParaRPr lang="en-US" dirty="0"/>
           </a:p>
@@ -1297,7 +1297,7 @@
             <a:fld id="{B61BEF0D-F0BB-DE4B-95CE-6DB70DBA9567}" type="datetimeFigureOut">
               <a:rPr lang="en-US" dirty="0"/>
               <a:pPr/>
-              <a:t>1/6/2025</a:t>
+              <a:t>1/7/2025</a:t>
             </a:fld>
             <a:endParaRPr lang="en-US" dirty="0"/>
           </a:p>
@@ -1612,7 +1612,7 @@
             <a:fld id="{B61BEF0D-F0BB-DE4B-95CE-6DB70DBA9567}" type="datetimeFigureOut">
               <a:rPr lang="en-US" dirty="0"/>
               <a:pPr/>
-              <a:t>1/6/2025</a:t>
+              <a:t>1/7/2025</a:t>
             </a:fld>
             <a:endParaRPr lang="en-US" dirty="0"/>
           </a:p>
@@ -1911,7 +1911,7 @@
             <a:fld id="{B61BEF0D-F0BB-DE4B-95CE-6DB70DBA9567}" type="datetimeFigureOut">
               <a:rPr lang="en-US" dirty="0"/>
               <a:pPr/>
-              <a:t>1/6/2025</a:t>
+              <a:t>1/7/2025</a:t>
             </a:fld>
             <a:endParaRPr lang="en-US" dirty="0"/>
           </a:p>
@@ -2275,7 +2275,7 @@
             <a:fld id="{B61BEF0D-F0BB-DE4B-95CE-6DB70DBA9567}" type="datetimeFigureOut">
               <a:rPr lang="en-US" dirty="0"/>
               <a:pPr/>
-              <a:t>1/6/2025</a:t>
+              <a:t>1/7/2025</a:t>
             </a:fld>
             <a:endParaRPr lang="en-US" dirty="0"/>
           </a:p>
@@ -2446,7 +2446,7 @@
             <a:fld id="{B61BEF0D-F0BB-DE4B-95CE-6DB70DBA9567}" type="datetimeFigureOut">
               <a:rPr lang="en-US" dirty="0"/>
               <a:pPr/>
-              <a:t>1/6/2025</a:t>
+              <a:t>1/7/2025</a:t>
             </a:fld>
             <a:endParaRPr lang="en-US" dirty="0"/>
           </a:p>
@@ -2623,7 +2623,7 @@
             <a:fld id="{B61BEF0D-F0BB-DE4B-95CE-6DB70DBA9567}" type="datetimeFigureOut">
               <a:rPr lang="en-US" dirty="0"/>
               <a:pPr/>
-              <a:t>1/6/2025</a:t>
+              <a:t>1/7/2025</a:t>
             </a:fld>
             <a:endParaRPr lang="en-US" dirty="0"/>
           </a:p>
@@ -2790,7 +2790,7 @@
             <a:fld id="{B61BEF0D-F0BB-DE4B-95CE-6DB70DBA9567}" type="datetimeFigureOut">
               <a:rPr lang="en-US" dirty="0"/>
               <a:pPr/>
-              <a:t>1/6/2025</a:t>
+              <a:t>1/7/2025</a:t>
             </a:fld>
             <a:endParaRPr lang="en-US" dirty="0"/>
           </a:p>
@@ -3037,7 +3037,7 @@
             <a:fld id="{B61BEF0D-F0BB-DE4B-95CE-6DB70DBA9567}" type="datetimeFigureOut">
               <a:rPr lang="en-US" dirty="0"/>
               <a:pPr/>
-              <a:t>1/6/2025</a:t>
+              <a:t>1/7/2025</a:t>
             </a:fld>
             <a:endParaRPr lang="en-US" dirty="0"/>
           </a:p>
@@ -3270,7 +3270,7 @@
             <a:fld id="{B61BEF0D-F0BB-DE4B-95CE-6DB70DBA9567}" type="datetimeFigureOut">
               <a:rPr lang="en-US" dirty="0"/>
               <a:pPr/>
-              <a:t>1/6/2025</a:t>
+              <a:t>1/7/2025</a:t>
             </a:fld>
             <a:endParaRPr lang="en-US" dirty="0"/>
           </a:p>
@@ -3649,7 +3649,7 @@
             <a:fld id="{B61BEF0D-F0BB-DE4B-95CE-6DB70DBA9567}" type="datetimeFigureOut">
               <a:rPr lang="en-US" dirty="0"/>
               <a:pPr/>
-              <a:t>1/6/2025</a:t>
+              <a:t>1/7/2025</a:t>
             </a:fld>
             <a:endParaRPr lang="en-US" dirty="0"/>
           </a:p>
@@ -3764,7 +3764,7 @@
             <a:fld id="{B61BEF0D-F0BB-DE4B-95CE-6DB70DBA9567}" type="datetimeFigureOut">
               <a:rPr lang="en-US" dirty="0"/>
               <a:pPr/>
-              <a:t>1/6/2025</a:t>
+              <a:t>1/7/2025</a:t>
             </a:fld>
             <a:endParaRPr lang="en-US" dirty="0"/>
           </a:p>
@@ -3856,7 +3856,7 @@
             <a:fld id="{B61BEF0D-F0BB-DE4B-95CE-6DB70DBA9567}" type="datetimeFigureOut">
               <a:rPr lang="en-US" dirty="0"/>
               <a:pPr/>
-              <a:t>1/6/2025</a:t>
+              <a:t>1/7/2025</a:t>
             </a:fld>
             <a:endParaRPr lang="en-US" dirty="0"/>
           </a:p>
@@ -4108,7 +4108,7 @@
             <a:fld id="{B61BEF0D-F0BB-DE4B-95CE-6DB70DBA9567}" type="datetimeFigureOut">
               <a:rPr lang="en-US" dirty="0"/>
               <a:pPr/>
-              <a:t>1/6/2025</a:t>
+              <a:t>1/7/2025</a:t>
             </a:fld>
             <a:endParaRPr lang="en-US" dirty="0"/>
           </a:p>
@@ -4388,7 +4388,7 @@
             <a:fld id="{B61BEF0D-F0BB-DE4B-95CE-6DB70DBA9567}" type="datetimeFigureOut">
               <a:rPr lang="en-US" dirty="0"/>
               <a:pPr/>
-              <a:t>1/6/2025</a:t>
+              <a:t>1/7/2025</a:t>
             </a:fld>
             <a:endParaRPr lang="en-US" dirty="0"/>
           </a:p>
@@ -4791,7 +4791,7 @@
             <a:fld id="{B61BEF0D-F0BB-DE4B-95CE-6DB70DBA9567}" type="datetimeFigureOut">
               <a:rPr lang="en-US" dirty="0"/>
               <a:pPr/>
-              <a:t>1/6/2025</a:t>
+              <a:t>1/7/2025</a:t>
             </a:fld>
             <a:endParaRPr lang="en-US" dirty="0"/>
           </a:p>
@@ -5431,23 +5431,19 @@
                   <a:schemeClr val="tx1"/>
                 </a:solidFill>
               </a:rPr>
-              <a:t>Professor(s): Dr. Frank </a:t>
-            </a:r>
-            <a:r>
-              <a:rPr lang="en-US" sz="2400" dirty="0" err="1">
-                <a:solidFill>
-                  <a:schemeClr val="tx1"/>
-                </a:solidFill>
-              </a:rPr>
-              <a:t>Schlling</a:t>
-            </a:r>
-            <a:endParaRPr lang="en-US" sz="2400" dirty="0">
-              <a:solidFill>
-                <a:schemeClr val="tx1"/>
-              </a:solidFill>
-            </a:endParaRPr>
-          </a:p>
-          <a:p>
+              <a:t>Professor(s): Dr. </a:t>
+            </a:r>
+            <a:r>
+              <a:rPr lang="en-GB" sz="2400" dirty="0">
+                <a:solidFill>
+                  <a:schemeClr val="tx1"/>
+                </a:solidFill>
+              </a:rPr>
+              <a:t>FRANK-PETER SCHILLING</a:t>
+            </a:r>
+          </a:p>
+          <a:p>
+            <a:pPr marR="95920" algn="l"/>
             <a:r>
               <a:rPr lang="en-US" sz="2400" dirty="0">
                 <a:solidFill>
@@ -7795,6 +7791,31 @@
                 <a:cs typeface="Times New Roman" panose="02020603050405020304" pitchFamily="18" charset="0"/>
               </a:rPr>
               <a:t>Initial Steps:</a:t>
+            </a:r>
+          </a:p>
+          <a:p>
+            <a:pPr marL="742950" lvl="1" indent="-285750" algn="l">
+              <a:lnSpc>
+                <a:spcPct val="115000"/>
+              </a:lnSpc>
+              <a:spcAft>
+                <a:spcPts val="800"/>
+              </a:spcAft>
+              <a:buSzPts val="1000"/>
+              <a:buFont typeface="Courier New" panose="02070309020205020404" pitchFamily="49" charset="0"/>
+              <a:buChar char="o"/>
+              <a:tabLst>
+                <a:tab pos="914400" algn="l"/>
+              </a:tabLst>
+            </a:pPr>
+            <a:r>
+              <a:rPr lang="en-GB" sz="1400" kern="100" dirty="0">
+                <a:solidFill>
+                  <a:schemeClr val="tx1"/>
+                </a:solidFill>
+                <a:cs typeface="Times New Roman" panose="02020603050405020304" pitchFamily="18" charset="0"/>
+              </a:rPr>
+              <a:t>Attempted to generate masks using HSV Filtering, challenge is to adapt the code to various land types.</a:t>
             </a:r>
           </a:p>
           <a:p>

</xml_diff>

<commit_message>
push the projects as of now 2025.01.11
</commit_message>
<xml_diff>
--- a/cas_deepL_project/Eurosat_Image_Classification_Project.pptx
+++ b/cas_deepL_project/Eurosat_Image_Classification_Project.pptx
@@ -8,12 +8,13 @@
     <p:sldId id="256" r:id="rId2"/>
     <p:sldId id="257" r:id="rId3"/>
     <p:sldId id="259" r:id="rId4"/>
-    <p:sldId id="260" r:id="rId5"/>
-    <p:sldId id="261" r:id="rId6"/>
+    <p:sldId id="261" r:id="rId5"/>
+    <p:sldId id="266" r:id="rId6"/>
     <p:sldId id="262" r:id="rId7"/>
     <p:sldId id="263" r:id="rId8"/>
     <p:sldId id="264" r:id="rId9"/>
-    <p:sldId id="265" r:id="rId10"/>
+    <p:sldId id="267" r:id="rId10"/>
+    <p:sldId id="265" r:id="rId11"/>
   </p:sldIdLst>
   <p:sldSz cx="12192000" cy="6858000"/>
   <p:notesSz cx="6858000" cy="9144000"/>
@@ -312,7 +313,7 @@
             <a:fld id="{B61BEF0D-F0BB-DE4B-95CE-6DB70DBA9567}" type="datetimeFigureOut">
               <a:rPr lang="en-US" dirty="0"/>
               <a:pPr/>
-              <a:t>1/7/2025</a:t>
+              <a:t>1/11/2025</a:t>
             </a:fld>
             <a:endParaRPr lang="en-US" dirty="0"/>
           </a:p>
@@ -745,7 +746,7 @@
             <a:fld id="{B61BEF0D-F0BB-DE4B-95CE-6DB70DBA9567}" type="datetimeFigureOut">
               <a:rPr lang="en-US" dirty="0"/>
               <a:pPr/>
-              <a:t>1/7/2025</a:t>
+              <a:t>1/11/2025</a:t>
             </a:fld>
             <a:endParaRPr lang="en-US" dirty="0"/>
           </a:p>
@@ -992,7 +993,7 @@
             <a:fld id="{B61BEF0D-F0BB-DE4B-95CE-6DB70DBA9567}" type="datetimeFigureOut">
               <a:rPr lang="en-US" dirty="0"/>
               <a:pPr/>
-              <a:t>1/7/2025</a:t>
+              <a:t>1/11/2025</a:t>
             </a:fld>
             <a:endParaRPr lang="en-US" dirty="0"/>
           </a:p>
@@ -1297,7 +1298,7 @@
             <a:fld id="{B61BEF0D-F0BB-DE4B-95CE-6DB70DBA9567}" type="datetimeFigureOut">
               <a:rPr lang="en-US" dirty="0"/>
               <a:pPr/>
-              <a:t>1/7/2025</a:t>
+              <a:t>1/11/2025</a:t>
             </a:fld>
             <a:endParaRPr lang="en-US" dirty="0"/>
           </a:p>
@@ -1612,7 +1613,7 @@
             <a:fld id="{B61BEF0D-F0BB-DE4B-95CE-6DB70DBA9567}" type="datetimeFigureOut">
               <a:rPr lang="en-US" dirty="0"/>
               <a:pPr/>
-              <a:t>1/7/2025</a:t>
+              <a:t>1/11/2025</a:t>
             </a:fld>
             <a:endParaRPr lang="en-US" dirty="0"/>
           </a:p>
@@ -1911,7 +1912,7 @@
             <a:fld id="{B61BEF0D-F0BB-DE4B-95CE-6DB70DBA9567}" type="datetimeFigureOut">
               <a:rPr lang="en-US" dirty="0"/>
               <a:pPr/>
-              <a:t>1/7/2025</a:t>
+              <a:t>1/11/2025</a:t>
             </a:fld>
             <a:endParaRPr lang="en-US" dirty="0"/>
           </a:p>
@@ -2275,7 +2276,7 @@
             <a:fld id="{B61BEF0D-F0BB-DE4B-95CE-6DB70DBA9567}" type="datetimeFigureOut">
               <a:rPr lang="en-US" dirty="0"/>
               <a:pPr/>
-              <a:t>1/7/2025</a:t>
+              <a:t>1/11/2025</a:t>
             </a:fld>
             <a:endParaRPr lang="en-US" dirty="0"/>
           </a:p>
@@ -2446,7 +2447,7 @@
             <a:fld id="{B61BEF0D-F0BB-DE4B-95CE-6DB70DBA9567}" type="datetimeFigureOut">
               <a:rPr lang="en-US" dirty="0"/>
               <a:pPr/>
-              <a:t>1/7/2025</a:t>
+              <a:t>1/11/2025</a:t>
             </a:fld>
             <a:endParaRPr lang="en-US" dirty="0"/>
           </a:p>
@@ -2623,7 +2624,7 @@
             <a:fld id="{B61BEF0D-F0BB-DE4B-95CE-6DB70DBA9567}" type="datetimeFigureOut">
               <a:rPr lang="en-US" dirty="0"/>
               <a:pPr/>
-              <a:t>1/7/2025</a:t>
+              <a:t>1/11/2025</a:t>
             </a:fld>
             <a:endParaRPr lang="en-US" dirty="0"/>
           </a:p>
@@ -2790,7 +2791,7 @@
             <a:fld id="{B61BEF0D-F0BB-DE4B-95CE-6DB70DBA9567}" type="datetimeFigureOut">
               <a:rPr lang="en-US" dirty="0"/>
               <a:pPr/>
-              <a:t>1/7/2025</a:t>
+              <a:t>1/11/2025</a:t>
             </a:fld>
             <a:endParaRPr lang="en-US" dirty="0"/>
           </a:p>
@@ -3037,7 +3038,7 @@
             <a:fld id="{B61BEF0D-F0BB-DE4B-95CE-6DB70DBA9567}" type="datetimeFigureOut">
               <a:rPr lang="en-US" dirty="0"/>
               <a:pPr/>
-              <a:t>1/7/2025</a:t>
+              <a:t>1/11/2025</a:t>
             </a:fld>
             <a:endParaRPr lang="en-US" dirty="0"/>
           </a:p>
@@ -3270,7 +3271,7 @@
             <a:fld id="{B61BEF0D-F0BB-DE4B-95CE-6DB70DBA9567}" type="datetimeFigureOut">
               <a:rPr lang="en-US" dirty="0"/>
               <a:pPr/>
-              <a:t>1/7/2025</a:t>
+              <a:t>1/11/2025</a:t>
             </a:fld>
             <a:endParaRPr lang="en-US" dirty="0"/>
           </a:p>
@@ -3649,7 +3650,7 @@
             <a:fld id="{B61BEF0D-F0BB-DE4B-95CE-6DB70DBA9567}" type="datetimeFigureOut">
               <a:rPr lang="en-US" dirty="0"/>
               <a:pPr/>
-              <a:t>1/7/2025</a:t>
+              <a:t>1/11/2025</a:t>
             </a:fld>
             <a:endParaRPr lang="en-US" dirty="0"/>
           </a:p>
@@ -3764,7 +3765,7 @@
             <a:fld id="{B61BEF0D-F0BB-DE4B-95CE-6DB70DBA9567}" type="datetimeFigureOut">
               <a:rPr lang="en-US" dirty="0"/>
               <a:pPr/>
-              <a:t>1/7/2025</a:t>
+              <a:t>1/11/2025</a:t>
             </a:fld>
             <a:endParaRPr lang="en-US" dirty="0"/>
           </a:p>
@@ -3856,7 +3857,7 @@
             <a:fld id="{B61BEF0D-F0BB-DE4B-95CE-6DB70DBA9567}" type="datetimeFigureOut">
               <a:rPr lang="en-US" dirty="0"/>
               <a:pPr/>
-              <a:t>1/7/2025</a:t>
+              <a:t>1/11/2025</a:t>
             </a:fld>
             <a:endParaRPr lang="en-US" dirty="0"/>
           </a:p>
@@ -4108,7 +4109,7 @@
             <a:fld id="{B61BEF0D-F0BB-DE4B-95CE-6DB70DBA9567}" type="datetimeFigureOut">
               <a:rPr lang="en-US" dirty="0"/>
               <a:pPr/>
-              <a:t>1/7/2025</a:t>
+              <a:t>1/11/2025</a:t>
             </a:fld>
             <a:endParaRPr lang="en-US" dirty="0"/>
           </a:p>
@@ -4388,7 +4389,7 @@
             <a:fld id="{B61BEF0D-F0BB-DE4B-95CE-6DB70DBA9567}" type="datetimeFigureOut">
               <a:rPr lang="en-US" dirty="0"/>
               <a:pPr/>
-              <a:t>1/7/2025</a:t>
+              <a:t>1/11/2025</a:t>
             </a:fld>
             <a:endParaRPr lang="en-US" dirty="0"/>
           </a:p>
@@ -4791,7 +4792,7 @@
             <a:fld id="{B61BEF0D-F0BB-DE4B-95CE-6DB70DBA9567}" type="datetimeFigureOut">
               <a:rPr lang="en-US" dirty="0"/>
               <a:pPr/>
-              <a:t>1/7/2025</a:t>
+              <a:t>1/11/2025</a:t>
             </a:fld>
             <a:endParaRPr lang="en-US" dirty="0"/>
           </a:p>
@@ -5450,7 +5451,23 @@
                   <a:schemeClr val="tx1"/>
                 </a:solidFill>
               </a:rPr>
-              <a:t>Date: 06. Jan. 2025</a:t>
+              <a:t>Date</a:t>
+            </a:r>
+            <a:r>
+              <a:rPr lang="en-US" sz="2400">
+                <a:solidFill>
+                  <a:schemeClr val="tx1"/>
+                </a:solidFill>
+              </a:rPr>
+              <a:t>: 14. </a:t>
+            </a:r>
+            <a:r>
+              <a:rPr lang="en-US" sz="2400" dirty="0">
+                <a:solidFill>
+                  <a:schemeClr val="tx1"/>
+                </a:solidFill>
+              </a:rPr>
+              <a:t>Jan. 2025</a:t>
             </a:r>
             <a:endParaRPr lang="de-CH" sz="2400" dirty="0">
               <a:solidFill>
@@ -5464,6 +5481,157 @@
     <p:extLst>
       <p:ext uri="{BB962C8B-B14F-4D97-AF65-F5344CB8AC3E}">
         <p14:creationId xmlns:p14="http://schemas.microsoft.com/office/powerpoint/2010/main" val="1821904497"/>
+      </p:ext>
+    </p:extLst>
+  </p:cSld>
+  <p:clrMapOvr>
+    <a:masterClrMapping/>
+  </p:clrMapOvr>
+</p:sld>
+</file>
+
+<file path=ppt/slides/slide10.xml><?xml version="1.0" encoding="utf-8"?>
+<p:sld xmlns:a="http://schemas.openxmlformats.org/drawingml/2006/main" xmlns:r="http://schemas.openxmlformats.org/officeDocument/2006/relationships" xmlns:p="http://schemas.openxmlformats.org/presentationml/2006/main">
+  <p:cSld>
+    <p:spTree>
+      <p:nvGrpSpPr>
+        <p:cNvPr id="1" name="">
+          <a:extLst>
+            <a:ext uri="{FF2B5EF4-FFF2-40B4-BE49-F238E27FC236}">
+              <a16:creationId xmlns:a16="http://schemas.microsoft.com/office/drawing/2014/main" id="{534744B2-5F04-CE11-24F2-70BA5DED1EBE}"/>
+            </a:ext>
+          </a:extLst>
+        </p:cNvPr>
+        <p:cNvGrpSpPr/>
+        <p:nvPr/>
+      </p:nvGrpSpPr>
+      <p:grpSpPr>
+        <a:xfrm>
+          <a:off x="0" y="0"/>
+          <a:ext cx="0" cy="0"/>
+          <a:chOff x="0" y="0"/>
+          <a:chExt cx="0" cy="0"/>
+        </a:xfrm>
+      </p:grpSpPr>
+      <p:sp>
+        <p:nvSpPr>
+          <p:cNvPr id="2" name="Title 1">
+            <a:extLst>
+              <a:ext uri="{FF2B5EF4-FFF2-40B4-BE49-F238E27FC236}">
+                <a16:creationId xmlns:a16="http://schemas.microsoft.com/office/drawing/2014/main" id="{6C7139E2-CEE8-74EC-54C7-4AB83A10DC72}"/>
+              </a:ext>
+            </a:extLst>
+          </p:cNvPr>
+          <p:cNvSpPr>
+            <a:spLocks noGrp="1"/>
+          </p:cNvSpPr>
+          <p:nvPr>
+            <p:ph type="ctrTitle"/>
+          </p:nvPr>
+        </p:nvSpPr>
+        <p:spPr>
+          <a:xfrm>
+            <a:off x="684211" y="295897"/>
+            <a:ext cx="10869702" cy="1245550"/>
+          </a:xfrm>
+        </p:spPr>
+        <p:txBody>
+          <a:bodyPr>
+            <a:normAutofit fontScale="90000"/>
+          </a:bodyPr>
+          <a:lstStyle/>
+          <a:p>
+            <a:r>
+              <a:rPr lang="en-GB" b="1" dirty="0"/>
+              <a:t>EuroSAT Image Classification: </a:t>
+            </a:r>
+            <a:r>
+              <a:rPr lang="en-GB" sz="2900" dirty="0"/>
+              <a:t>Identifying Land Cover Types</a:t>
+            </a:r>
+            <a:endParaRPr lang="de-CH" sz="2900" dirty="0"/>
+          </a:p>
+        </p:txBody>
+      </p:sp>
+      <p:sp>
+        <p:nvSpPr>
+          <p:cNvPr id="3" name="Subtitle 2">
+            <a:extLst>
+              <a:ext uri="{FF2B5EF4-FFF2-40B4-BE49-F238E27FC236}">
+                <a16:creationId xmlns:a16="http://schemas.microsoft.com/office/drawing/2014/main" id="{FD04FEE8-FC27-2C66-6FAA-E2D9D4DAAA28}"/>
+              </a:ext>
+            </a:extLst>
+          </p:cNvPr>
+          <p:cNvSpPr>
+            <a:spLocks noGrp="1"/>
+          </p:cNvSpPr>
+          <p:nvPr>
+            <p:ph type="subTitle" idx="1"/>
+          </p:nvPr>
+        </p:nvSpPr>
+        <p:spPr>
+          <a:xfrm>
+            <a:off x="744082" y="1541447"/>
+            <a:ext cx="10108975" cy="4662850"/>
+          </a:xfrm>
+        </p:spPr>
+        <p:txBody>
+          <a:bodyPr>
+            <a:noAutofit/>
+          </a:bodyPr>
+          <a:lstStyle/>
+          <a:p>
+            <a:endParaRPr lang="en-CH" sz="1600" kern="100" dirty="0">
+              <a:solidFill>
+                <a:schemeClr val="tx1"/>
+              </a:solidFill>
+              <a:effectLst/>
+              <a:ea typeface="Aptos" panose="020B0004020202020204" pitchFamily="34" charset="0"/>
+              <a:cs typeface="Times New Roman" panose="02020603050405020304" pitchFamily="18" charset="0"/>
+            </a:endParaRPr>
+          </a:p>
+          <a:p>
+            <a:pPr algn="ctr">
+              <a:lnSpc>
+                <a:spcPct val="115000"/>
+              </a:lnSpc>
+              <a:spcAft>
+                <a:spcPts val="800"/>
+              </a:spcAft>
+            </a:pPr>
+            <a:r>
+              <a:rPr lang="en-GB" sz="3000" b="1" dirty="0">
+                <a:solidFill>
+                  <a:schemeClr val="tx1"/>
+                </a:solidFill>
+                <a:effectLst/>
+                <a:latin typeface="+mj-lt"/>
+                <a:ea typeface="Aptos" panose="020B0004020202020204" pitchFamily="34" charset="0"/>
+                <a:cs typeface="Times New Roman" panose="02020603050405020304" pitchFamily="18" charset="0"/>
+              </a:rPr>
+              <a:t>Thank you</a:t>
+            </a:r>
+            <a:endParaRPr lang="en-CH" sz="3000" b="1" kern="100" dirty="0">
+              <a:solidFill>
+                <a:schemeClr val="tx1"/>
+              </a:solidFill>
+              <a:latin typeface="+mj-lt"/>
+              <a:cs typeface="Times New Roman" panose="02020603050405020304" pitchFamily="18" charset="0"/>
+            </a:endParaRPr>
+          </a:p>
+          <a:p>
+            <a:endParaRPr lang="en-GB" sz="1600" dirty="0">
+              <a:solidFill>
+                <a:schemeClr val="tx1"/>
+              </a:solidFill>
+            </a:endParaRPr>
+          </a:p>
+        </p:txBody>
+      </p:sp>
+    </p:spTree>
+    <p:extLst>
+      <p:ext uri="{BB962C8B-B14F-4D97-AF65-F5344CB8AC3E}">
+        <p14:creationId xmlns:p14="http://schemas.microsoft.com/office/powerpoint/2010/main" val="1489757524"/>
       </p:ext>
     </p:extLst>
   </p:cSld>
@@ -6118,7 +6286,7 @@
         <p:cNvPr id="1" name="">
           <a:extLst>
             <a:ext uri="{FF2B5EF4-FFF2-40B4-BE49-F238E27FC236}">
-              <a16:creationId xmlns:a16="http://schemas.microsoft.com/office/drawing/2014/main" id="{D660AF86-A857-5EC0-60F1-7E5B602BE486}"/>
+              <a16:creationId xmlns:a16="http://schemas.microsoft.com/office/drawing/2014/main" id="{BB3DA4F9-7035-97DB-5E17-B8DF1372F89B}"/>
             </a:ext>
           </a:extLst>
         </p:cNvPr>
@@ -6138,7 +6306,7 @@
           <p:cNvPr id="2" name="Title 1">
             <a:extLst>
               <a:ext uri="{FF2B5EF4-FFF2-40B4-BE49-F238E27FC236}">
-                <a16:creationId xmlns:a16="http://schemas.microsoft.com/office/drawing/2014/main" id="{BD1775B5-F436-87DC-3EE5-2AF260E5F9EC}"/>
+                <a16:creationId xmlns:a16="http://schemas.microsoft.com/office/drawing/2014/main" id="{AE151116-A7E1-B8A9-215E-23286E8D36F1}"/>
               </a:ext>
             </a:extLst>
           </p:cNvPr>
@@ -6178,7 +6346,7 @@
           <p:cNvPr id="3" name="Subtitle 2">
             <a:extLst>
               <a:ext uri="{FF2B5EF4-FFF2-40B4-BE49-F238E27FC236}">
-                <a16:creationId xmlns:a16="http://schemas.microsoft.com/office/drawing/2014/main" id="{9F2BC57D-67A5-0C75-F34A-81A1C2C27DB7}"/>
+                <a16:creationId xmlns:a16="http://schemas.microsoft.com/office/drawing/2014/main" id="{D26C6BDA-FED7-4064-F0F9-C34B072431E8}"/>
               </a:ext>
             </a:extLst>
           </p:cNvPr>
@@ -6192,36 +6360,41 @@
         <p:spPr>
           <a:xfrm>
             <a:off x="684211" y="1683521"/>
-            <a:ext cx="10108975" cy="4662850"/>
+            <a:ext cx="10582503" cy="5435736"/>
           </a:xfrm>
         </p:spPr>
         <p:txBody>
           <a:bodyPr>
-            <a:normAutofit fontScale="92500"/>
+            <a:noAutofit/>
           </a:bodyPr>
           <a:lstStyle/>
           <a:p>
-            <a:endParaRPr lang="en-US" sz="200" b="1" dirty="0">
+            <a:pPr>
+              <a:lnSpc>
+                <a:spcPct val="115000"/>
+              </a:lnSpc>
+              <a:spcAft>
+                <a:spcPts val="800"/>
+              </a:spcAft>
+            </a:pPr>
+            <a:r>
+              <a:rPr lang="en-CH" sz="2200" b="1" kern="100" dirty="0">
+                <a:solidFill>
+                  <a:schemeClr val="tx1"/>
+                </a:solidFill>
+                <a:effectLst/>
+                <a:ea typeface="Aptos" panose="020B0004020202020204" pitchFamily="34" charset="0"/>
+                <a:cs typeface="Times New Roman" panose="02020603050405020304" pitchFamily="18" charset="0"/>
+              </a:rPr>
+              <a:t>Baseline CNN Results:</a:t>
+            </a:r>
+            <a:endParaRPr lang="en-CH" sz="2200" kern="100" dirty="0">
               <a:solidFill>
                 <a:schemeClr val="tx1"/>
               </a:solidFill>
-            </a:endParaRPr>
-          </a:p>
-          <a:p>
-            <a:r>
-              <a:rPr lang="en-US" sz="2400" b="1" dirty="0">
-                <a:solidFill>
-                  <a:schemeClr val="tx1"/>
-                </a:solidFill>
-              </a:rPr>
-              <a:t>Model Development Journey</a:t>
-            </a:r>
-          </a:p>
-          <a:p>
-            <a:endParaRPr lang="en-US" sz="1000" b="1" dirty="0">
-              <a:solidFill>
-                <a:schemeClr val="tx1"/>
-              </a:solidFill>
+              <a:effectLst/>
+              <a:ea typeface="Aptos" panose="020B0004020202020204" pitchFamily="34" charset="0"/>
+              <a:cs typeface="Times New Roman" panose="02020603050405020304" pitchFamily="18" charset="0"/>
             </a:endParaRPr>
           </a:p>
           <a:p>
@@ -6240,7 +6413,7 @@
               </a:tabLst>
             </a:pPr>
             <a:r>
-              <a:rPr lang="en-CH" sz="2200" b="1" kern="100" dirty="0">
+              <a:rPr lang="en-CH" sz="1800" kern="100" dirty="0">
                 <a:solidFill>
                   <a:schemeClr val="tx1"/>
                 </a:solidFill>
@@ -6248,50 +6421,8 @@
                 <a:ea typeface="Aptos" panose="020B0004020202020204" pitchFamily="34" charset="0"/>
                 <a:cs typeface="Times New Roman" panose="02020603050405020304" pitchFamily="18" charset="0"/>
               </a:rPr>
-              <a:t>Initial Challenges:</a:t>
-            </a:r>
-            <a:endParaRPr lang="en-GB" sz="2200" kern="100" dirty="0">
-              <a:solidFill>
-                <a:schemeClr val="tx1"/>
-              </a:solidFill>
-              <a:ea typeface="Aptos" panose="020B0004020202020204" pitchFamily="34" charset="0"/>
-              <a:cs typeface="Times New Roman" panose="02020603050405020304" pitchFamily="18" charset="0"/>
-            </a:endParaRPr>
-          </a:p>
-          <a:p>
-            <a:pPr marL="800100" lvl="1" indent="-342900">
-              <a:lnSpc>
-                <a:spcPct val="115000"/>
-              </a:lnSpc>
-              <a:spcAft>
-                <a:spcPts val="800"/>
-              </a:spcAft>
-              <a:buSzPts val="1000"/>
-              <a:buFont typeface="Symbol" panose="05050102010706020507" pitchFamily="18" charset="2"/>
-              <a:buChar char=""/>
-              <a:tabLst>
-                <a:tab pos="457200" algn="l"/>
-              </a:tabLst>
-            </a:pPr>
-            <a:r>
-              <a:rPr lang="en-CH" sz="1700" b="1" kern="100" dirty="0">
-                <a:solidFill>
-                  <a:schemeClr val="tx1"/>
-                </a:solidFill>
-                <a:effectLst/>
-                <a:ea typeface="Aptos" panose="020B0004020202020204" pitchFamily="34" charset="0"/>
-                <a:cs typeface="Times New Roman" panose="02020603050405020304" pitchFamily="18" charset="0"/>
-              </a:rPr>
-              <a:t>Faced issues while loading large image datasets, resolved by using data generators for efficient loading and processing.</a:t>
-            </a:r>
-            <a:endParaRPr lang="en-CH" sz="1700" kern="100" dirty="0">
-              <a:solidFill>
-                <a:schemeClr val="tx1"/>
-              </a:solidFill>
-              <a:effectLst/>
-              <a:ea typeface="Aptos" panose="020B0004020202020204" pitchFamily="34" charset="0"/>
-              <a:cs typeface="Times New Roman" panose="02020603050405020304" pitchFamily="18" charset="0"/>
-            </a:endParaRPr>
+              <a:t>Test Loss: 3.8675</a:t>
+            </a:r>
           </a:p>
           <a:p>
             <a:pPr marL="342900" lvl="0" indent="-342900">
@@ -6309,23 +6440,19 @@
               </a:tabLst>
             </a:pPr>
             <a:r>
-              <a:rPr lang="en-CH" sz="2200" b="1" kern="100" dirty="0">
-                <a:solidFill>
-                  <a:schemeClr val="tx1"/>
-                </a:solidFill>
+              <a:rPr lang="en-CH" sz="1800" kern="100" dirty="0">
+                <a:solidFill>
+                  <a:schemeClr val="tx1"/>
+                </a:solidFill>
+                <a:effectLst/>
+                <a:ea typeface="Aptos" panose="020B0004020202020204" pitchFamily="34" charset="0"/>
                 <a:cs typeface="Times New Roman" panose="02020603050405020304" pitchFamily="18" charset="0"/>
               </a:rPr>
-              <a:t>Model Iterations:</a:t>
-            </a:r>
-            <a:endParaRPr lang="en-GB" sz="2200" b="1" kern="100" dirty="0">
-              <a:solidFill>
-                <a:schemeClr val="tx1"/>
-              </a:solidFill>
-              <a:cs typeface="Times New Roman" panose="02020603050405020304" pitchFamily="18" charset="0"/>
-            </a:endParaRPr>
-          </a:p>
-          <a:p>
-            <a:pPr marL="800100" lvl="1" indent="-342900">
+              <a:t>Test Accuracy: 29.06%</a:t>
+            </a:r>
+          </a:p>
+          <a:p>
+            <a:pPr marL="342900" lvl="0" indent="-342900">
               <a:lnSpc>
                 <a:spcPct val="115000"/>
               </a:lnSpc>
@@ -6340,23 +6467,133 @@
               </a:tabLst>
             </a:pPr>
             <a:r>
-              <a:rPr lang="en-CH" sz="2200" b="1" kern="100" dirty="0">
-                <a:solidFill>
-                  <a:schemeClr val="tx1"/>
-                </a:solidFill>
+              <a:rPr lang="en-CH" sz="1800" kern="100" dirty="0">
+                <a:solidFill>
+                  <a:schemeClr val="tx1"/>
+                </a:solidFill>
+                <a:effectLst/>
+                <a:ea typeface="Aptos" panose="020B0004020202020204" pitchFamily="34" charset="0"/>
                 <a:cs typeface="Times New Roman" panose="02020603050405020304" pitchFamily="18" charset="0"/>
               </a:rPr>
-              <a:t>Baseline: Simple CNN model to establish initial performance.</a:t>
-            </a:r>
-            <a:endParaRPr lang="en-GB" sz="2200" b="1" kern="100" dirty="0">
-              <a:solidFill>
-                <a:schemeClr val="tx1"/>
-              </a:solidFill>
-              <a:cs typeface="Times New Roman" panose="02020603050405020304" pitchFamily="18" charset="0"/>
-            </a:endParaRPr>
-          </a:p>
-          <a:p>
-            <a:pPr marL="800100" lvl="1" indent="-342900">
+              <a:t>Classification Report Highlights:</a:t>
+            </a:r>
+          </a:p>
+          <a:p>
+            <a:pPr marL="742950" lvl="1" indent="-285750">
+              <a:lnSpc>
+                <a:spcPct val="115000"/>
+              </a:lnSpc>
+              <a:spcAft>
+                <a:spcPts val="800"/>
+              </a:spcAft>
+              <a:buSzPts val="1000"/>
+              <a:buFont typeface="Courier New" panose="02070309020205020404" pitchFamily="49" charset="0"/>
+              <a:buChar char="o"/>
+              <a:tabLst>
+                <a:tab pos="914400" algn="l"/>
+              </a:tabLst>
+            </a:pPr>
+            <a:r>
+              <a:rPr lang="en-CH" i="1" kern="100" dirty="0">
+                <a:solidFill>
+                  <a:schemeClr val="tx1"/>
+                </a:solidFill>
+                <a:effectLst/>
+                <a:ea typeface="Aptos" panose="020B0004020202020204" pitchFamily="34" charset="0"/>
+                <a:cs typeface="Times New Roman" panose="02020603050405020304" pitchFamily="18" charset="0"/>
+              </a:rPr>
+              <a:t>Forest</a:t>
+            </a:r>
+            <a:r>
+              <a:rPr lang="en-CH" kern="100" dirty="0">
+                <a:solidFill>
+                  <a:schemeClr val="tx1"/>
+                </a:solidFill>
+                <a:effectLst/>
+                <a:ea typeface="Aptos" panose="020B0004020202020204" pitchFamily="34" charset="0"/>
+                <a:cs typeface="Times New Roman" panose="02020603050405020304" pitchFamily="18" charset="0"/>
+              </a:rPr>
+              <a:t>: Precision = 0.00, Recall = 0.00</a:t>
+            </a:r>
+          </a:p>
+          <a:p>
+            <a:pPr marL="742950" lvl="1" indent="-285750">
+              <a:lnSpc>
+                <a:spcPct val="115000"/>
+              </a:lnSpc>
+              <a:spcAft>
+                <a:spcPts val="800"/>
+              </a:spcAft>
+              <a:buSzPts val="1000"/>
+              <a:buFont typeface="Courier New" panose="02070309020205020404" pitchFamily="49" charset="0"/>
+              <a:buChar char="o"/>
+              <a:tabLst>
+                <a:tab pos="914400" algn="l"/>
+              </a:tabLst>
+            </a:pPr>
+            <a:r>
+              <a:rPr lang="en-CH" i="1" kern="100" dirty="0" err="1">
+                <a:solidFill>
+                  <a:schemeClr val="tx1"/>
+                </a:solidFill>
+                <a:effectLst/>
+                <a:ea typeface="Aptos" panose="020B0004020202020204" pitchFamily="34" charset="0"/>
+                <a:cs typeface="Times New Roman" panose="02020603050405020304" pitchFamily="18" charset="0"/>
+              </a:rPr>
+              <a:t>HerbaceousVegetation</a:t>
+            </a:r>
+            <a:r>
+              <a:rPr lang="en-CH" kern="100" dirty="0">
+                <a:solidFill>
+                  <a:schemeClr val="tx1"/>
+                </a:solidFill>
+                <a:effectLst/>
+                <a:ea typeface="Aptos" panose="020B0004020202020204" pitchFamily="34" charset="0"/>
+                <a:cs typeface="Times New Roman" panose="02020603050405020304" pitchFamily="18" charset="0"/>
+              </a:rPr>
+              <a:t>: F1-Score = 0.40 (best-performing class)</a:t>
+            </a:r>
+          </a:p>
+          <a:p>
+            <a:pPr marL="742950" lvl="1" indent="-285750">
+              <a:lnSpc>
+                <a:spcPct val="115000"/>
+              </a:lnSpc>
+              <a:spcAft>
+                <a:spcPts val="800"/>
+              </a:spcAft>
+              <a:buSzPts val="1000"/>
+              <a:buFont typeface="Courier New" panose="02070309020205020404" pitchFamily="49" charset="0"/>
+              <a:buChar char="o"/>
+              <a:tabLst>
+                <a:tab pos="914400" algn="l"/>
+              </a:tabLst>
+            </a:pPr>
+            <a:r>
+              <a:rPr lang="en-CH" i="1" kern="100" dirty="0">
+                <a:solidFill>
+                  <a:schemeClr val="tx1"/>
+                </a:solidFill>
+                <a:effectLst/>
+                <a:ea typeface="Aptos" panose="020B0004020202020204" pitchFamily="34" charset="0"/>
+                <a:cs typeface="Times New Roman" panose="02020603050405020304" pitchFamily="18" charset="0"/>
+              </a:rPr>
+              <a:t>Industrial</a:t>
+            </a:r>
+            <a:r>
+              <a:rPr lang="en-CH" kern="100" dirty="0">
+                <a:solidFill>
+                  <a:schemeClr val="tx1"/>
+                </a:solidFill>
+                <a:effectLst/>
+                <a:ea typeface="Aptos" panose="020B0004020202020204" pitchFamily="34" charset="0"/>
+                <a:cs typeface="Times New Roman" panose="02020603050405020304" pitchFamily="18" charset="0"/>
+              </a:rPr>
+              <a:t>: Recall = 0.90, but low precision.</a:t>
+            </a:r>
+          </a:p>
+          <a:p>
+            <a:pPr marL="342900" lvl="0" indent="-342900">
               <a:lnSpc>
                 <a:spcPct val="115000"/>
               </a:lnSpc>
@@ -6371,23 +6608,19 @@
               </a:tabLst>
             </a:pPr>
             <a:r>
-              <a:rPr lang="en-CH" sz="2200" b="1" kern="100" dirty="0">
-                <a:solidFill>
-                  <a:schemeClr val="tx1"/>
-                </a:solidFill>
+              <a:rPr lang="en-CH" sz="1800" b="1" kern="100" dirty="0">
+                <a:solidFill>
+                  <a:schemeClr val="tx1"/>
+                </a:solidFill>
+                <a:effectLst/>
+                <a:ea typeface="Aptos" panose="020B0004020202020204" pitchFamily="34" charset="0"/>
                 <a:cs typeface="Times New Roman" panose="02020603050405020304" pitchFamily="18" charset="0"/>
               </a:rPr>
-              <a:t>Enhancement: CNN with data augmentation to improve generalization.</a:t>
-            </a:r>
-            <a:endParaRPr lang="en-GB" sz="2200" b="1" kern="100" dirty="0">
-              <a:solidFill>
-                <a:schemeClr val="tx1"/>
-              </a:solidFill>
-              <a:cs typeface="Times New Roman" panose="02020603050405020304" pitchFamily="18" charset="0"/>
-            </a:endParaRPr>
-          </a:p>
-          <a:p>
-            <a:pPr marL="800100" lvl="1" indent="-342900">
+              <a:t>Key Observations:</a:t>
+            </a:r>
+          </a:p>
+          <a:p>
+            <a:pPr marL="742950" lvl="1" indent="-285750">
               <a:lnSpc>
                 <a:spcPct val="115000"/>
               </a:lnSpc>
@@ -6395,43 +6628,37 @@
                 <a:spcPts val="800"/>
               </a:spcAft>
               <a:buSzPts val="1000"/>
-              <a:buFont typeface="Symbol" panose="05050102010706020507" pitchFamily="18" charset="2"/>
-              <a:buChar char=""/>
+              <a:buFont typeface="Courier New" panose="02070309020205020404" pitchFamily="49" charset="0"/>
+              <a:buChar char="o"/>
               <a:tabLst>
-                <a:tab pos="457200" algn="l"/>
+                <a:tab pos="914400" algn="l"/>
               </a:tabLst>
             </a:pPr>
             <a:r>
-              <a:rPr lang="en-CH" sz="2200" b="1" kern="100" dirty="0">
-                <a:solidFill>
-                  <a:schemeClr val="tx1"/>
-                </a:solidFill>
+              <a:rPr lang="en-CH" kern="100" dirty="0">
+                <a:solidFill>
+                  <a:schemeClr val="tx1"/>
+                </a:solidFill>
+                <a:effectLst/>
+                <a:ea typeface="Aptos" panose="020B0004020202020204" pitchFamily="34" charset="0"/>
                 <a:cs typeface="Times New Roman" panose="02020603050405020304" pitchFamily="18" charset="0"/>
               </a:rPr>
-              <a:t>Optimization: Further trained CNN with learning rate adjustments to stabilize and enhance training.</a:t>
-            </a:r>
-          </a:p>
-          <a:p>
-            <a:pPr lvl="1"/>
-            <a:endParaRPr lang="en-GB" sz="4100" dirty="0">
+              <a:t>Struggles with highly imbalanced recall across classes.</a:t>
+            </a:r>
+          </a:p>
+          <a:p>
+            <a:endParaRPr lang="en-GB" sz="2000" dirty="0">
               <a:solidFill>
                 <a:schemeClr val="tx1"/>
               </a:solidFill>
             </a:endParaRPr>
           </a:p>
-          <a:p>
-            <a:endParaRPr lang="en-GB" sz="4400" dirty="0">
-              <a:solidFill>
-                <a:schemeClr val="tx1"/>
-              </a:solidFill>
-            </a:endParaRPr>
-          </a:p>
         </p:txBody>
       </p:sp>
     </p:spTree>
     <p:extLst>
       <p:ext uri="{BB962C8B-B14F-4D97-AF65-F5344CB8AC3E}">
-        <p14:creationId xmlns:p14="http://schemas.microsoft.com/office/powerpoint/2010/main" val="665331151"/>
+        <p14:creationId xmlns:p14="http://schemas.microsoft.com/office/powerpoint/2010/main" val="95375855"/>
       </p:ext>
     </p:extLst>
   </p:cSld>
@@ -6449,7 +6676,7 @@
         <p:cNvPr id="1" name="">
           <a:extLst>
             <a:ext uri="{FF2B5EF4-FFF2-40B4-BE49-F238E27FC236}">
-              <a16:creationId xmlns:a16="http://schemas.microsoft.com/office/drawing/2014/main" id="{BB3DA4F9-7035-97DB-5E17-B8DF1372F89B}"/>
+              <a16:creationId xmlns:a16="http://schemas.microsoft.com/office/drawing/2014/main" id="{9DEE6EF7-A57B-E2DB-A4B1-92D12A37E6BA}"/>
             </a:ext>
           </a:extLst>
         </p:cNvPr>
@@ -6469,7 +6696,7 @@
           <p:cNvPr id="2" name="Title 1">
             <a:extLst>
               <a:ext uri="{FF2B5EF4-FFF2-40B4-BE49-F238E27FC236}">
-                <a16:creationId xmlns:a16="http://schemas.microsoft.com/office/drawing/2014/main" id="{AE151116-A7E1-B8A9-215E-23286E8D36F1}"/>
+                <a16:creationId xmlns:a16="http://schemas.microsoft.com/office/drawing/2014/main" id="{19285532-0570-08B2-BE03-A23D4725B052}"/>
               </a:ext>
             </a:extLst>
           </p:cNvPr>
@@ -6509,7 +6736,7 @@
           <p:cNvPr id="3" name="Subtitle 2">
             <a:extLst>
               <a:ext uri="{FF2B5EF4-FFF2-40B4-BE49-F238E27FC236}">
-                <a16:creationId xmlns:a16="http://schemas.microsoft.com/office/drawing/2014/main" id="{D26C6BDA-FED7-4064-F0F9-C34B072431E8}"/>
+                <a16:creationId xmlns:a16="http://schemas.microsoft.com/office/drawing/2014/main" id="{46BE54B0-2236-B4EC-C965-20940331693B}"/>
               </a:ext>
             </a:extLst>
           </p:cNvPr>
@@ -6541,7 +6768,7 @@
               </a:spcAft>
             </a:pPr>
             <a:r>
-              <a:rPr lang="en-CH" sz="2200" b="1" kern="100" dirty="0">
+              <a:rPr lang="en-GB" sz="2200" b="1" kern="100" dirty="0">
                 <a:solidFill>
                   <a:schemeClr val="tx1"/>
                 </a:solidFill>
@@ -6549,9 +6776,21 @@
                 <a:ea typeface="Aptos" panose="020B0004020202020204" pitchFamily="34" charset="0"/>
                 <a:cs typeface="Times New Roman" panose="02020603050405020304" pitchFamily="18" charset="0"/>
               </a:rPr>
-              <a:t>Baseline CNN Results:</a:t>
-            </a:r>
-            <a:endParaRPr lang="en-CH" sz="2200" kern="100" dirty="0">
+              <a:t>Data Loading Challenges and Solutions</a:t>
+            </a:r>
+          </a:p>
+          <a:p>
+            <a:pPr marL="171450" indent="-171450">
+              <a:lnSpc>
+                <a:spcPct val="115000"/>
+              </a:lnSpc>
+              <a:spcAft>
+                <a:spcPts val="800"/>
+              </a:spcAft>
+              <a:buFont typeface="Arial" panose="020B0604020202020204" pitchFamily="34" charset="0"/>
+              <a:buChar char="•"/>
+            </a:pPr>
+            <a:endParaRPr lang="en-GB" sz="200" b="1" kern="100" dirty="0">
               <a:solidFill>
                 <a:schemeClr val="tx1"/>
               </a:solidFill>
@@ -6561,22 +6800,18 @@
             </a:endParaRPr>
           </a:p>
           <a:p>
-            <a:pPr marL="342900" lvl="0" indent="-342900">
+            <a:pPr marL="342900" indent="-342900">
               <a:lnSpc>
                 <a:spcPct val="115000"/>
               </a:lnSpc>
               <a:spcAft>
                 <a:spcPts val="800"/>
               </a:spcAft>
-              <a:buSzPts val="1000"/>
-              <a:buFont typeface="Symbol" panose="05050102010706020507" pitchFamily="18" charset="2"/>
-              <a:buChar char=""/>
-              <a:tabLst>
-                <a:tab pos="457200" algn="l"/>
-              </a:tabLst>
+              <a:buFont typeface="Arial" panose="020B0604020202020204" pitchFamily="34" charset="0"/>
+              <a:buChar char="•"/>
             </a:pPr>
             <a:r>
-              <a:rPr lang="en-CH" sz="1800" kern="100" dirty="0">
+              <a:rPr lang="en-GB" sz="1800" kern="100" dirty="0">
                 <a:solidFill>
                   <a:schemeClr val="tx1"/>
                 </a:solidFill>
@@ -6584,26 +6819,22 @@
                 <a:ea typeface="Aptos" panose="020B0004020202020204" pitchFamily="34" charset="0"/>
                 <a:cs typeface="Times New Roman" panose="02020603050405020304" pitchFamily="18" charset="0"/>
               </a:rPr>
-              <a:t>Test Loss: 3.8675</a:t>
-            </a:r>
-          </a:p>
-          <a:p>
-            <a:pPr marL="342900" lvl="0" indent="-342900">
+              <a:t>Faced challenges with large image datasets:</a:t>
+            </a:r>
+          </a:p>
+          <a:p>
+            <a:pPr marL="342900" indent="-342900">
               <a:lnSpc>
                 <a:spcPct val="115000"/>
               </a:lnSpc>
               <a:spcAft>
                 <a:spcPts val="800"/>
               </a:spcAft>
-              <a:buSzPts val="1000"/>
-              <a:buFont typeface="Symbol" panose="05050102010706020507" pitchFamily="18" charset="2"/>
-              <a:buChar char=""/>
-              <a:tabLst>
-                <a:tab pos="457200" algn="l"/>
-              </a:tabLst>
+              <a:buFont typeface="Arial" panose="020B0604020202020204" pitchFamily="34" charset="0"/>
+              <a:buChar char="•"/>
             </a:pPr>
             <a:r>
-              <a:rPr lang="en-CH" sz="1800" kern="100" dirty="0">
+              <a:rPr lang="en-GB" sz="1800" kern="100" dirty="0">
                 <a:solidFill>
                   <a:schemeClr val="tx1"/>
                 </a:solidFill>
@@ -6611,26 +6842,22 @@
                 <a:ea typeface="Aptos" panose="020B0004020202020204" pitchFamily="34" charset="0"/>
                 <a:cs typeface="Times New Roman" panose="02020603050405020304" pitchFamily="18" charset="0"/>
               </a:rPr>
-              <a:t>Test Accuracy: 29.06%</a:t>
-            </a:r>
-          </a:p>
-          <a:p>
-            <a:pPr marL="342900" lvl="0" indent="-342900">
+              <a:t>High memory usage during preprocessing and training.</a:t>
+            </a:r>
+          </a:p>
+          <a:p>
+            <a:pPr marL="342900" indent="-342900">
               <a:lnSpc>
                 <a:spcPct val="115000"/>
               </a:lnSpc>
               <a:spcAft>
                 <a:spcPts val="800"/>
               </a:spcAft>
-              <a:buSzPts val="1000"/>
-              <a:buFont typeface="Symbol" panose="05050102010706020507" pitchFamily="18" charset="2"/>
-              <a:buChar char=""/>
-              <a:tabLst>
-                <a:tab pos="457200" algn="l"/>
-              </a:tabLst>
+              <a:buFont typeface="Arial" panose="020B0604020202020204" pitchFamily="34" charset="0"/>
+              <a:buChar char="•"/>
             </a:pPr>
             <a:r>
-              <a:rPr lang="en-CH" sz="1800" kern="100" dirty="0">
+              <a:rPr lang="en-GB" sz="1800" kern="100" dirty="0">
                 <a:solidFill>
                   <a:schemeClr val="tx1"/>
                 </a:solidFill>
@@ -6638,64 +6865,38 @@
                 <a:ea typeface="Aptos" panose="020B0004020202020204" pitchFamily="34" charset="0"/>
                 <a:cs typeface="Times New Roman" panose="02020603050405020304" pitchFamily="18" charset="0"/>
               </a:rPr>
-              <a:t>Classification Report Highlights:</a:t>
-            </a:r>
-          </a:p>
-          <a:p>
-            <a:pPr marL="742950" lvl="1" indent="-285750">
+              <a:t>Inefficient data loading slowed down model training.</a:t>
+            </a:r>
+          </a:p>
+          <a:p>
+            <a:pPr>
               <a:lnSpc>
                 <a:spcPct val="115000"/>
               </a:lnSpc>
               <a:spcAft>
                 <a:spcPts val="800"/>
               </a:spcAft>
-              <a:buSzPts val="1000"/>
-              <a:buFont typeface="Courier New" panose="02070309020205020404" pitchFamily="49" charset="0"/>
-              <a:buChar char="o"/>
-              <a:tabLst>
-                <a:tab pos="914400" algn="l"/>
-              </a:tabLst>
             </a:pPr>
-            <a:r>
-              <a:rPr lang="en-CH" i="1" kern="100" dirty="0">
-                <a:solidFill>
-                  <a:schemeClr val="tx1"/>
-                </a:solidFill>
-                <a:effectLst/>
-                <a:ea typeface="Aptos" panose="020B0004020202020204" pitchFamily="34" charset="0"/>
-                <a:cs typeface="Times New Roman" panose="02020603050405020304" pitchFamily="18" charset="0"/>
-              </a:rPr>
-              <a:t>Forest</a:t>
-            </a:r>
-            <a:r>
-              <a:rPr lang="en-CH" kern="100" dirty="0">
-                <a:solidFill>
-                  <a:schemeClr val="tx1"/>
-                </a:solidFill>
-                <a:effectLst/>
-                <a:ea typeface="Aptos" panose="020B0004020202020204" pitchFamily="34" charset="0"/>
-                <a:cs typeface="Times New Roman" panose="02020603050405020304" pitchFamily="18" charset="0"/>
-              </a:rPr>
-              <a:t>: Precision = 0.00, Recall = 0.00</a:t>
-            </a:r>
-          </a:p>
-          <a:p>
-            <a:pPr marL="742950" lvl="1" indent="-285750">
+            <a:endParaRPr lang="en-GB" sz="400" kern="100" dirty="0">
+              <a:solidFill>
+                <a:schemeClr val="tx1"/>
+              </a:solidFill>
+              <a:effectLst/>
+              <a:ea typeface="Aptos" panose="020B0004020202020204" pitchFamily="34" charset="0"/>
+              <a:cs typeface="Times New Roman" panose="02020603050405020304" pitchFamily="18" charset="0"/>
+            </a:endParaRPr>
+          </a:p>
+          <a:p>
+            <a:pPr>
               <a:lnSpc>
                 <a:spcPct val="115000"/>
               </a:lnSpc>
               <a:spcAft>
                 <a:spcPts val="800"/>
               </a:spcAft>
-              <a:buSzPts val="1000"/>
-              <a:buFont typeface="Courier New" panose="02070309020205020404" pitchFamily="49" charset="0"/>
-              <a:buChar char="o"/>
-              <a:tabLst>
-                <a:tab pos="914400" algn="l"/>
-              </a:tabLst>
             </a:pPr>
             <a:r>
-              <a:rPr lang="en-CH" i="1" kern="100" dirty="0" err="1">
+              <a:rPr lang="en-GB" sz="2200" b="1" kern="100" dirty="0">
                 <a:solidFill>
                   <a:schemeClr val="tx1"/>
                 </a:solidFill>
@@ -6703,37 +6904,22 @@
                 <a:ea typeface="Aptos" panose="020B0004020202020204" pitchFamily="34" charset="0"/>
                 <a:cs typeface="Times New Roman" panose="02020603050405020304" pitchFamily="18" charset="0"/>
               </a:rPr>
-              <a:t>HerbaceousVegetation</a:t>
-            </a:r>
-            <a:r>
-              <a:rPr lang="en-CH" kern="100" dirty="0">
-                <a:solidFill>
-                  <a:schemeClr val="tx1"/>
-                </a:solidFill>
-                <a:effectLst/>
-                <a:ea typeface="Aptos" panose="020B0004020202020204" pitchFamily="34" charset="0"/>
-                <a:cs typeface="Times New Roman" panose="02020603050405020304" pitchFamily="18" charset="0"/>
-              </a:rPr>
-              <a:t>: F1-Score = 0.40 (best-performing class)</a:t>
-            </a:r>
-          </a:p>
-          <a:p>
-            <a:pPr marL="742950" lvl="1" indent="-285750">
+              <a:t>Solution:</a:t>
+            </a:r>
+          </a:p>
+          <a:p>
+            <a:pPr marL="285750" indent="-285750">
               <a:lnSpc>
                 <a:spcPct val="115000"/>
               </a:lnSpc>
               <a:spcAft>
                 <a:spcPts val="800"/>
               </a:spcAft>
-              <a:buSzPts val="1000"/>
-              <a:buFont typeface="Courier New" panose="02070309020205020404" pitchFamily="49" charset="0"/>
-              <a:buChar char="o"/>
-              <a:tabLst>
-                <a:tab pos="914400" algn="l"/>
-              </a:tabLst>
+              <a:buFont typeface="Arial" panose="020B0604020202020204" pitchFamily="34" charset="0"/>
+              <a:buChar char="•"/>
             </a:pPr>
             <a:r>
-              <a:rPr lang="en-CH" i="1" kern="100" dirty="0">
+              <a:rPr lang="en-GB" sz="1800" kern="100" dirty="0">
                 <a:solidFill>
                   <a:schemeClr val="tx1"/>
                 </a:solidFill>
@@ -6741,37 +6927,22 @@
                 <a:ea typeface="Aptos" panose="020B0004020202020204" pitchFamily="34" charset="0"/>
                 <a:cs typeface="Times New Roman" panose="02020603050405020304" pitchFamily="18" charset="0"/>
               </a:rPr>
-              <a:t>Industrial</a:t>
-            </a:r>
-            <a:r>
-              <a:rPr lang="en-CH" kern="100" dirty="0">
-                <a:solidFill>
-                  <a:schemeClr val="tx1"/>
-                </a:solidFill>
-                <a:effectLst/>
-                <a:ea typeface="Aptos" panose="020B0004020202020204" pitchFamily="34" charset="0"/>
-                <a:cs typeface="Times New Roman" panose="02020603050405020304" pitchFamily="18" charset="0"/>
-              </a:rPr>
-              <a:t>: Recall = 0.90, but low precision.</a:t>
-            </a:r>
-          </a:p>
-          <a:p>
-            <a:pPr marL="342900" lvl="0" indent="-342900">
+              <a:t>Utilized data generators for efficient loading and preprocessing.</a:t>
+            </a:r>
+          </a:p>
+          <a:p>
+            <a:pPr marL="285750" indent="-285750">
               <a:lnSpc>
                 <a:spcPct val="115000"/>
               </a:lnSpc>
               <a:spcAft>
                 <a:spcPts val="800"/>
               </a:spcAft>
-              <a:buSzPts val="1000"/>
-              <a:buFont typeface="Symbol" panose="05050102010706020507" pitchFamily="18" charset="2"/>
-              <a:buChar char=""/>
-              <a:tabLst>
-                <a:tab pos="457200" algn="l"/>
-              </a:tabLst>
+              <a:buFont typeface="Arial" panose="020B0604020202020204" pitchFamily="34" charset="0"/>
+              <a:buChar char="•"/>
             </a:pPr>
             <a:r>
-              <a:rPr lang="en-CH" sz="1800" b="1" kern="100" dirty="0">
+              <a:rPr lang="en-GB" sz="1800" kern="100" dirty="0">
                 <a:solidFill>
                   <a:schemeClr val="tx1"/>
                 </a:solidFill>
@@ -6779,26 +6950,22 @@
                 <a:ea typeface="Aptos" panose="020B0004020202020204" pitchFamily="34" charset="0"/>
                 <a:cs typeface="Times New Roman" panose="02020603050405020304" pitchFamily="18" charset="0"/>
               </a:rPr>
-              <a:t>Key Observations:</a:t>
-            </a:r>
-          </a:p>
-          <a:p>
-            <a:pPr marL="742950" lvl="1" indent="-285750">
+              <a:t>Enabled batch-wise image loading to reduce memory usage.</a:t>
+            </a:r>
+          </a:p>
+          <a:p>
+            <a:pPr marL="285750" indent="-285750">
               <a:lnSpc>
                 <a:spcPct val="115000"/>
               </a:lnSpc>
               <a:spcAft>
                 <a:spcPts val="800"/>
               </a:spcAft>
-              <a:buSzPts val="1000"/>
-              <a:buFont typeface="Courier New" panose="02070309020205020404" pitchFamily="49" charset="0"/>
-              <a:buChar char="o"/>
-              <a:tabLst>
-                <a:tab pos="914400" algn="l"/>
-              </a:tabLst>
+              <a:buFont typeface="Arial" panose="020B0604020202020204" pitchFamily="34" charset="0"/>
+              <a:buChar char="•"/>
             </a:pPr>
             <a:r>
-              <a:rPr lang="en-CH" kern="100" dirty="0">
+              <a:rPr lang="en-GB" sz="1800" kern="100" dirty="0">
                 <a:solidFill>
                   <a:schemeClr val="tx1"/>
                 </a:solidFill>
@@ -6806,11 +6973,9 @@
                 <a:ea typeface="Aptos" panose="020B0004020202020204" pitchFamily="34" charset="0"/>
                 <a:cs typeface="Times New Roman" panose="02020603050405020304" pitchFamily="18" charset="0"/>
               </a:rPr>
-              <a:t>Struggles with highly imbalanced recall across classes.</a:t>
-            </a:r>
-          </a:p>
-          <a:p>
-            <a:endParaRPr lang="en-GB" sz="2000" dirty="0">
+              <a:t>Improved training speed and scalability.</a:t>
+            </a:r>
+            <a:endParaRPr lang="en-GB" sz="1800" dirty="0">
               <a:solidFill>
                 <a:schemeClr val="tx1"/>
               </a:solidFill>
@@ -6821,7 +6986,7 @@
     </p:spTree>
     <p:extLst>
       <p:ext uri="{BB962C8B-B14F-4D97-AF65-F5344CB8AC3E}">
-        <p14:creationId xmlns:p14="http://schemas.microsoft.com/office/powerpoint/2010/main" val="95375855"/>
+        <p14:creationId xmlns:p14="http://schemas.microsoft.com/office/powerpoint/2010/main" val="3815143882"/>
       </p:ext>
     </p:extLst>
   </p:cSld>
@@ -6941,7 +7106,7 @@
               </a:spcAft>
             </a:pPr>
             <a:r>
-              <a:rPr lang="en-CH" sz="2200" b="1" kern="100" dirty="0">
+              <a:rPr lang="en-GB" sz="2200" b="1" kern="100" dirty="0">
                 <a:solidFill>
                   <a:schemeClr val="tx1"/>
                 </a:solidFill>
@@ -6949,34 +7114,22 @@
                 <a:ea typeface="Aptos" panose="020B0004020202020204" pitchFamily="34" charset="0"/>
                 <a:cs typeface="Times New Roman" panose="02020603050405020304" pitchFamily="18" charset="0"/>
               </a:rPr>
-              <a:t>CNN with Data Augmentation:</a:t>
-            </a:r>
-            <a:endParaRPr lang="en-CH" sz="2200" kern="100" dirty="0">
-              <a:solidFill>
-                <a:schemeClr val="tx1"/>
-              </a:solidFill>
-              <a:effectLst/>
-              <a:ea typeface="Aptos" panose="020B0004020202020204" pitchFamily="34" charset="0"/>
-              <a:cs typeface="Times New Roman" panose="02020603050405020304" pitchFamily="18" charset="0"/>
-            </a:endParaRPr>
-          </a:p>
-          <a:p>
-            <a:pPr marL="342900" lvl="0" indent="-342900">
+              <a:t>Challenges with Multi-Class Classification</a:t>
+            </a:r>
+          </a:p>
+          <a:p>
+            <a:pPr marL="342900" indent="-342900">
               <a:lnSpc>
                 <a:spcPct val="115000"/>
               </a:lnSpc>
               <a:spcAft>
                 <a:spcPts val="800"/>
               </a:spcAft>
-              <a:buSzPts val="1000"/>
-              <a:buFont typeface="Symbol" panose="05050102010706020507" pitchFamily="18" charset="2"/>
-              <a:buChar char=""/>
-              <a:tabLst>
-                <a:tab pos="457200" algn="l"/>
-              </a:tabLst>
+              <a:buFont typeface="Arial" panose="020B0604020202020204" pitchFamily="34" charset="0"/>
+              <a:buChar char="•"/>
             </a:pPr>
             <a:r>
-              <a:rPr lang="en-CH" sz="1600" kern="100" dirty="0">
+              <a:rPr lang="en-GB" sz="2000" kern="100" dirty="0">
                 <a:solidFill>
                   <a:schemeClr val="tx1"/>
                 </a:solidFill>
@@ -6984,26 +7137,22 @@
                 <a:ea typeface="Aptos" panose="020B0004020202020204" pitchFamily="34" charset="0"/>
                 <a:cs typeface="Times New Roman" panose="02020603050405020304" pitchFamily="18" charset="0"/>
               </a:rPr>
-              <a:t>Test Loss: 2.4430</a:t>
-            </a:r>
-          </a:p>
-          <a:p>
-            <a:pPr marL="342900" lvl="0" indent="-342900">
+              <a:t>Test accuracy remained low (~24%) despite applying data augmentation.</a:t>
+            </a:r>
+          </a:p>
+          <a:p>
+            <a:pPr marL="342900" indent="-342900">
               <a:lnSpc>
                 <a:spcPct val="115000"/>
               </a:lnSpc>
               <a:spcAft>
                 <a:spcPts val="800"/>
               </a:spcAft>
-              <a:buSzPts val="1000"/>
-              <a:buFont typeface="Symbol" panose="05050102010706020507" pitchFamily="18" charset="2"/>
-              <a:buChar char=""/>
-              <a:tabLst>
-                <a:tab pos="457200" algn="l"/>
-              </a:tabLst>
+              <a:buFont typeface="Arial" panose="020B0604020202020204" pitchFamily="34" charset="0"/>
+              <a:buChar char="•"/>
             </a:pPr>
             <a:r>
-              <a:rPr lang="en-CH" sz="1600" kern="100" dirty="0">
+              <a:rPr lang="en-GB" sz="2000" kern="100" dirty="0">
                 <a:solidFill>
                   <a:schemeClr val="tx1"/>
                 </a:solidFill>
@@ -7011,26 +7160,22 @@
                 <a:ea typeface="Aptos" panose="020B0004020202020204" pitchFamily="34" charset="0"/>
                 <a:cs typeface="Times New Roman" panose="02020603050405020304" pitchFamily="18" charset="0"/>
               </a:rPr>
-              <a:t>Test Accuracy: 24.62%</a:t>
-            </a:r>
-          </a:p>
-          <a:p>
-            <a:pPr marL="342900" lvl="0" indent="-342900">
+              <a:t>Significant precision-recall imbalance across classes.</a:t>
+            </a:r>
+          </a:p>
+          <a:p>
+            <a:pPr marL="342900" indent="-342900">
               <a:lnSpc>
                 <a:spcPct val="115000"/>
               </a:lnSpc>
               <a:spcAft>
                 <a:spcPts val="800"/>
               </a:spcAft>
-              <a:buSzPts val="1000"/>
-              <a:buFont typeface="Symbol" panose="05050102010706020507" pitchFamily="18" charset="2"/>
-              <a:buChar char=""/>
-              <a:tabLst>
-                <a:tab pos="457200" algn="l"/>
-              </a:tabLst>
+              <a:buFont typeface="Arial" panose="020B0604020202020204" pitchFamily="34" charset="0"/>
+              <a:buChar char="•"/>
             </a:pPr>
             <a:r>
-              <a:rPr lang="en-CH" sz="1600" kern="100" dirty="0">
+              <a:rPr lang="en-GB" sz="2000" kern="100" dirty="0">
                 <a:solidFill>
                   <a:schemeClr val="tx1"/>
                 </a:solidFill>
@@ -7038,26 +7183,42 @@
                 <a:ea typeface="Aptos" panose="020B0004020202020204" pitchFamily="34" charset="0"/>
                 <a:cs typeface="Times New Roman" panose="02020603050405020304" pitchFamily="18" charset="0"/>
               </a:rPr>
-              <a:t>Classification Report Highlights:</a:t>
-            </a:r>
-          </a:p>
-          <a:p>
-            <a:pPr marL="742950" lvl="1" indent="-285750">
+              <a:t>Overlapping features between Residential and </a:t>
+            </a:r>
+            <a:r>
+              <a:rPr lang="en-GB" sz="2000" kern="100" dirty="0" err="1">
+                <a:solidFill>
+                  <a:schemeClr val="tx1"/>
+                </a:solidFill>
+                <a:effectLst/>
+                <a:ea typeface="Aptos" panose="020B0004020202020204" pitchFamily="34" charset="0"/>
+                <a:cs typeface="Times New Roman" panose="02020603050405020304" pitchFamily="18" charset="0"/>
+              </a:rPr>
+              <a:t>AnnualCrop</a:t>
+            </a:r>
+            <a:r>
+              <a:rPr lang="en-GB" sz="2000" kern="100" dirty="0">
+                <a:solidFill>
+                  <a:schemeClr val="tx1"/>
+                </a:solidFill>
+                <a:effectLst/>
+                <a:ea typeface="Aptos" panose="020B0004020202020204" pitchFamily="34" charset="0"/>
+                <a:cs typeface="Times New Roman" panose="02020603050405020304" pitchFamily="18" charset="0"/>
+              </a:rPr>
+              <a:t> complicated classification.</a:t>
+            </a:r>
+          </a:p>
+          <a:p>
+            <a:pPr>
               <a:lnSpc>
                 <a:spcPct val="115000"/>
               </a:lnSpc>
               <a:spcAft>
                 <a:spcPts val="800"/>
               </a:spcAft>
-              <a:buSzPts val="1000"/>
-              <a:buFont typeface="Courier New" panose="02070309020205020404" pitchFamily="49" charset="0"/>
-              <a:buChar char="o"/>
-              <a:tabLst>
-                <a:tab pos="914400" algn="l"/>
-              </a:tabLst>
             </a:pPr>
             <a:r>
-              <a:rPr lang="en-CH" sz="1600" i="1" kern="100" dirty="0">
+              <a:rPr lang="en-GB" sz="2200" b="1" kern="100" dirty="0">
                 <a:solidFill>
                   <a:schemeClr val="tx1"/>
                 </a:solidFill>
@@ -7065,37 +7226,22 @@
                 <a:ea typeface="Aptos" panose="020B0004020202020204" pitchFamily="34" charset="0"/>
                 <a:cs typeface="Times New Roman" panose="02020603050405020304" pitchFamily="18" charset="0"/>
               </a:rPr>
-              <a:t>Residential</a:t>
-            </a:r>
-            <a:r>
-              <a:rPr lang="en-CH" sz="1600" kern="100" dirty="0">
-                <a:solidFill>
-                  <a:schemeClr val="tx1"/>
-                </a:solidFill>
-                <a:effectLst/>
-                <a:ea typeface="Aptos" panose="020B0004020202020204" pitchFamily="34" charset="0"/>
-                <a:cs typeface="Times New Roman" panose="02020603050405020304" pitchFamily="18" charset="0"/>
-              </a:rPr>
-              <a:t>: High recall (0.98), low precision (0.20).</a:t>
-            </a:r>
-          </a:p>
-          <a:p>
-            <a:pPr marL="742950" lvl="1" indent="-285750">
+              <a:t>Outcome: </a:t>
+            </a:r>
+          </a:p>
+          <a:p>
+            <a:pPr marL="342900" indent="-342900">
               <a:lnSpc>
                 <a:spcPct val="115000"/>
               </a:lnSpc>
               <a:spcAft>
                 <a:spcPts val="800"/>
               </a:spcAft>
-              <a:buSzPts val="1000"/>
-              <a:buFont typeface="Courier New" panose="02070309020205020404" pitchFamily="49" charset="0"/>
-              <a:buChar char="o"/>
-              <a:tabLst>
-                <a:tab pos="914400" algn="l"/>
-              </a:tabLst>
+              <a:buFont typeface="Arial" panose="020B0604020202020204" pitchFamily="34" charset="0"/>
+              <a:buChar char="•"/>
             </a:pPr>
             <a:r>
-              <a:rPr lang="en-CH" sz="1600" i="1" kern="100" dirty="0" err="1">
+              <a:rPr lang="en-GB" sz="2000" kern="100" dirty="0">
                 <a:solidFill>
                   <a:schemeClr val="tx1"/>
                 </a:solidFill>
@@ -7103,119 +7249,28 @@
                 <a:ea typeface="Aptos" panose="020B0004020202020204" pitchFamily="34" charset="0"/>
                 <a:cs typeface="Times New Roman" panose="02020603050405020304" pitchFamily="18" charset="0"/>
               </a:rPr>
-              <a:t>AnnualCrop</a:t>
-            </a:r>
-            <a:r>
-              <a:rPr lang="en-CH" sz="1600" kern="100" dirty="0">
-                <a:solidFill>
-                  <a:schemeClr val="tx1"/>
-                </a:solidFill>
-                <a:effectLst/>
-                <a:ea typeface="Aptos" panose="020B0004020202020204" pitchFamily="34" charset="0"/>
-                <a:cs typeface="Times New Roman" panose="02020603050405020304" pitchFamily="18" charset="0"/>
-              </a:rPr>
-              <a:t>: F1-Score = 0.46 (best-performing class).</a:t>
-            </a:r>
-          </a:p>
-          <a:p>
-            <a:pPr marL="742950" lvl="1" indent="-285750">
+              <a:t>Motivated the shift to binary classification for clearer results.</a:t>
+            </a:r>
+          </a:p>
+          <a:p>
+            <a:pPr marL="342900" indent="-342900">
               <a:lnSpc>
                 <a:spcPct val="115000"/>
               </a:lnSpc>
               <a:spcAft>
                 <a:spcPts val="800"/>
               </a:spcAft>
-              <a:buSzPts val="1000"/>
-              <a:buFont typeface="Courier New" panose="02070309020205020404" pitchFamily="49" charset="0"/>
-              <a:buChar char="o"/>
-              <a:tabLst>
-                <a:tab pos="914400" algn="l"/>
-              </a:tabLst>
+              <a:buFont typeface="Arial" panose="020B0604020202020204" pitchFamily="34" charset="0"/>
+              <a:buChar char="•"/>
             </a:pPr>
             <a:r>
-              <a:rPr lang="en-CH" sz="1600" i="1" kern="100" dirty="0">
-                <a:solidFill>
-                  <a:schemeClr val="tx1"/>
-                </a:solidFill>
-                <a:effectLst/>
-                <a:ea typeface="Aptos" panose="020B0004020202020204" pitchFamily="34" charset="0"/>
-                <a:cs typeface="Times New Roman" panose="02020603050405020304" pitchFamily="18" charset="0"/>
-              </a:rPr>
-              <a:t>Other Classes</a:t>
-            </a:r>
-            <a:r>
-              <a:rPr lang="en-CH" sz="1600" kern="100" dirty="0">
-                <a:solidFill>
-                  <a:schemeClr val="tx1"/>
-                </a:solidFill>
-                <a:effectLst/>
-                <a:ea typeface="Aptos" panose="020B0004020202020204" pitchFamily="34" charset="0"/>
-                <a:cs typeface="Times New Roman" panose="02020603050405020304" pitchFamily="18" charset="0"/>
-              </a:rPr>
-              <a:t>: Poor precision and recall.</a:t>
-            </a:r>
-          </a:p>
-          <a:p>
-            <a:pPr marL="342900" lvl="0" indent="-342900">
-              <a:lnSpc>
-                <a:spcPct val="115000"/>
-              </a:lnSpc>
-              <a:spcAft>
-                <a:spcPts val="800"/>
-              </a:spcAft>
-              <a:buSzPts val="1000"/>
-              <a:buFont typeface="Symbol" panose="05050102010706020507" pitchFamily="18" charset="2"/>
-              <a:buChar char=""/>
-              <a:tabLst>
-                <a:tab pos="457200" algn="l"/>
-              </a:tabLst>
-            </a:pPr>
-            <a:r>
-              <a:rPr lang="en-CH" sz="1600" b="1" kern="100" dirty="0">
-                <a:solidFill>
-                  <a:schemeClr val="tx1"/>
-                </a:solidFill>
-                <a:effectLst/>
-                <a:ea typeface="Aptos" panose="020B0004020202020204" pitchFamily="34" charset="0"/>
-                <a:cs typeface="Times New Roman" panose="02020603050405020304" pitchFamily="18" charset="0"/>
-              </a:rPr>
-              <a:t>Key Observations:</a:t>
-            </a:r>
-          </a:p>
-          <a:p>
-            <a:pPr marL="742950" lvl="1" indent="-285750">
-              <a:lnSpc>
-                <a:spcPct val="115000"/>
-              </a:lnSpc>
-              <a:spcAft>
-                <a:spcPts val="800"/>
-              </a:spcAft>
-              <a:buSzPts val="1000"/>
-              <a:buFont typeface="Courier New" panose="02070309020205020404" pitchFamily="49" charset="0"/>
-              <a:buChar char="o"/>
-              <a:tabLst>
-                <a:tab pos="914400" algn="l"/>
-              </a:tabLst>
-            </a:pPr>
-            <a:r>
-              <a:rPr lang="en-CH" sz="1600" kern="100" dirty="0">
-                <a:solidFill>
-                  <a:schemeClr val="tx1"/>
-                </a:solidFill>
-                <a:effectLst/>
-                <a:ea typeface="Aptos" panose="020B0004020202020204" pitchFamily="34" charset="0"/>
-                <a:cs typeface="Times New Roman" panose="02020603050405020304" pitchFamily="18" charset="0"/>
-              </a:rPr>
-              <a:t>Data augmentation improved class diversity but reduced overall accuracy.</a:t>
-            </a:r>
-          </a:p>
-          <a:p>
-            <a:pPr lvl="1"/>
-            <a:endParaRPr lang="en-GB" sz="1600" dirty="0">
-              <a:solidFill>
-                <a:schemeClr val="tx1"/>
-              </a:solidFill>
-            </a:endParaRPr>
+              <a:rPr lang="en-GB" sz="2000" dirty="0">
+                <a:solidFill>
+                  <a:schemeClr val="tx1"/>
+                </a:solidFill>
+              </a:rPr>
+              <a:t>Simplified the task to focus on clearer decision boundaries.</a:t>
+            </a:r>
           </a:p>
           <a:p>
             <a:endParaRPr lang="en-GB" sz="2000" dirty="0">
@@ -7340,16 +7395,20 @@
             </a:endParaRPr>
           </a:p>
           <a:p>
-            <a:pPr>
+            <a:pPr lvl="0">
               <a:lnSpc>
                 <a:spcPct val="115000"/>
               </a:lnSpc>
               <a:spcAft>
                 <a:spcPts val="800"/>
               </a:spcAft>
+              <a:buSzPts val="1000"/>
+              <a:tabLst>
+                <a:tab pos="457200" algn="l"/>
+              </a:tabLst>
             </a:pPr>
             <a:r>
-              <a:rPr lang="en-GB" sz="2200" b="1" kern="100" dirty="0">
+              <a:rPr lang="en-GB" sz="1600" b="1" kern="100" dirty="0">
                 <a:solidFill>
                   <a:schemeClr val="tx1"/>
                 </a:solidFill>
@@ -7357,9 +7416,9 @@
                 <a:ea typeface="Aptos" panose="020B0004020202020204" pitchFamily="34" charset="0"/>
                 <a:cs typeface="Times New Roman" panose="02020603050405020304" pitchFamily="18" charset="0"/>
               </a:rPr>
-              <a:t>Key Insights</a:t>
-            </a:r>
-            <a:endParaRPr lang="en-CH" sz="2200" b="1" kern="100" dirty="0">
+              <a:t>Binary Classification Results:</a:t>
+            </a:r>
+            <a:endParaRPr lang="en-GB" sz="1600" kern="100" dirty="0">
               <a:solidFill>
                 <a:schemeClr val="tx1"/>
               </a:solidFill>
@@ -7369,7 +7428,7 @@
             </a:endParaRPr>
           </a:p>
           <a:p>
-            <a:pPr marL="342900" lvl="0" indent="-342900">
+            <a:pPr marL="285750" lvl="0" indent="-285750">
               <a:lnSpc>
                 <a:spcPct val="115000"/>
               </a:lnSpc>
@@ -7377,14 +7436,14 @@
                 <a:spcPts val="800"/>
               </a:spcAft>
               <a:buSzPts val="1000"/>
-              <a:buFont typeface="Symbol" panose="05050102010706020507" pitchFamily="18" charset="2"/>
-              <a:buChar char=""/>
+              <a:buFont typeface="Arial" panose="020B0604020202020204" pitchFamily="34" charset="0"/>
+              <a:buChar char="•"/>
               <a:tabLst>
                 <a:tab pos="457200" algn="l"/>
               </a:tabLst>
             </a:pPr>
             <a:r>
-              <a:rPr lang="en-CH" sz="1600" kern="100" dirty="0">
+              <a:rPr lang="en-GB" sz="1600" kern="100" dirty="0">
                 <a:solidFill>
                   <a:schemeClr val="tx1"/>
                 </a:solidFill>
@@ -7392,33 +7451,11 @@
                 <a:ea typeface="Aptos" panose="020B0004020202020204" pitchFamily="34" charset="0"/>
                 <a:cs typeface="Times New Roman" panose="02020603050405020304" pitchFamily="18" charset="0"/>
               </a:rPr>
-              <a:t>Both models struggled with visually similar land cover types (e.g., Forest vs. </a:t>
-            </a:r>
-            <a:r>
-              <a:rPr lang="en-CH" sz="1600" kern="100" dirty="0" err="1">
-                <a:solidFill>
-                  <a:schemeClr val="tx1"/>
-                </a:solidFill>
-                <a:effectLst/>
-                <a:ea typeface="Aptos" panose="020B0004020202020204" pitchFamily="34" charset="0"/>
-                <a:cs typeface="Times New Roman" panose="02020603050405020304" pitchFamily="18" charset="0"/>
-              </a:rPr>
-              <a:t>HerbaceousVegetation</a:t>
-            </a:r>
-            <a:r>
-              <a:rPr lang="en-CH" sz="1600" kern="100" dirty="0">
-                <a:solidFill>
-                  <a:schemeClr val="tx1"/>
-                </a:solidFill>
-                <a:effectLst/>
-                <a:ea typeface="Aptos" panose="020B0004020202020204" pitchFamily="34" charset="0"/>
-                <a:cs typeface="Times New Roman" panose="02020603050405020304" pitchFamily="18" charset="0"/>
-              </a:rPr>
-              <a:t>).</a:t>
-            </a:r>
-          </a:p>
-          <a:p>
-            <a:pPr marL="342900" lvl="0" indent="-342900">
+              <a:t>Achieved ~97% accuracy with minimal misclassifications (confusion matrix shows only 22 errors out of ~1200 predictions).</a:t>
+            </a:r>
+          </a:p>
+          <a:p>
+            <a:pPr marL="285750" lvl="0" indent="-285750">
               <a:lnSpc>
                 <a:spcPct val="115000"/>
               </a:lnSpc>
@@ -7426,14 +7463,14 @@
                 <a:spcPts val="800"/>
               </a:spcAft>
               <a:buSzPts val="1000"/>
-              <a:buFont typeface="Symbol" panose="05050102010706020507" pitchFamily="18" charset="2"/>
-              <a:buChar char=""/>
+              <a:buFont typeface="Arial" panose="020B0604020202020204" pitchFamily="34" charset="0"/>
+              <a:buChar char="•"/>
               <a:tabLst>
                 <a:tab pos="457200" algn="l"/>
               </a:tabLst>
             </a:pPr>
             <a:r>
-              <a:rPr lang="en-CH" sz="1600" kern="100" dirty="0">
+              <a:rPr lang="en-GB" sz="1600" kern="100" dirty="0">
                 <a:solidFill>
                   <a:schemeClr val="tx1"/>
                 </a:solidFill>
@@ -7441,11 +7478,11 @@
                 <a:ea typeface="Aptos" panose="020B0004020202020204" pitchFamily="34" charset="0"/>
                 <a:cs typeface="Times New Roman" panose="02020603050405020304" pitchFamily="18" charset="0"/>
               </a:rPr>
-              <a:t>Data augmentation improved diversity but didn’t resolve class imbalance issues.</a:t>
-            </a:r>
-          </a:p>
-          <a:p>
-            <a:pPr marL="342900" lvl="0" indent="-342900">
+              <a:t>Precision and recall stabilized over training, showing strong generalization (see rightmost graph).</a:t>
+            </a:r>
+          </a:p>
+          <a:p>
+            <a:pPr marL="285750" lvl="0" indent="-285750">
               <a:lnSpc>
                 <a:spcPct val="115000"/>
               </a:lnSpc>
@@ -7453,47 +7490,22 @@
                 <a:spcPts val="800"/>
               </a:spcAft>
               <a:buSzPts val="1000"/>
-              <a:buFont typeface="Symbol" panose="05050102010706020507" pitchFamily="18" charset="2"/>
-              <a:buChar char=""/>
+              <a:buFont typeface="Arial" panose="020B0604020202020204" pitchFamily="34" charset="0"/>
+              <a:buChar char="•"/>
               <a:tabLst>
                 <a:tab pos="457200" algn="l"/>
               </a:tabLst>
             </a:pPr>
-            <a:r>
-              <a:rPr lang="en-CH" sz="1600" kern="100" dirty="0">
-                <a:solidFill>
-                  <a:schemeClr val="tx1"/>
-                </a:solidFill>
-                <a:effectLst/>
-                <a:ea typeface="Aptos" panose="020B0004020202020204" pitchFamily="34" charset="0"/>
-                <a:cs typeface="Times New Roman" panose="02020603050405020304" pitchFamily="18" charset="0"/>
-              </a:rPr>
-              <a:t>Imbalanced recall across classes remains a key challenge.</a:t>
-            </a:r>
-          </a:p>
-          <a:p>
-            <a:pPr>
-              <a:lnSpc>
-                <a:spcPct val="115000"/>
-              </a:lnSpc>
-              <a:spcAft>
-                <a:spcPts val="800"/>
-              </a:spcAft>
-            </a:pPr>
-            <a:r>
-              <a:rPr lang="en-CH" sz="1800" b="1" kern="100" dirty="0">
-                <a:solidFill>
-                  <a:schemeClr val="tx1"/>
-                </a:solidFill>
-                <a:effectLst/>
-                <a:ea typeface="Aptos" panose="020B0004020202020204" pitchFamily="34" charset="0"/>
-                <a:cs typeface="Times New Roman" panose="02020603050405020304" pitchFamily="18" charset="0"/>
-              </a:rPr>
-              <a:t>Next Steps:</a:t>
-            </a:r>
-          </a:p>
-          <a:p>
-            <a:pPr marL="342900" lvl="0" indent="-342900">
+            <a:endParaRPr lang="en-GB" sz="1600" kern="100" dirty="0">
+              <a:solidFill>
+                <a:schemeClr val="tx1"/>
+              </a:solidFill>
+              <a:ea typeface="Aptos" panose="020B0004020202020204" pitchFamily="34" charset="0"/>
+              <a:cs typeface="Times New Roman" panose="02020603050405020304" pitchFamily="18" charset="0"/>
+            </a:endParaRPr>
+          </a:p>
+          <a:p>
+            <a:pPr marL="285750" lvl="0" indent="-285750">
               <a:lnSpc>
                 <a:spcPct val="115000"/>
               </a:lnSpc>
@@ -7501,48 +7513,23 @@
                 <a:spcPts val="800"/>
               </a:spcAft>
               <a:buSzPts val="1000"/>
-              <a:buFont typeface="Symbol" panose="05050102010706020507" pitchFamily="18" charset="2"/>
-              <a:buChar char=""/>
+              <a:buFont typeface="Arial" panose="020B0604020202020204" pitchFamily="34" charset="0"/>
+              <a:buChar char="•"/>
               <a:tabLst>
                 <a:tab pos="457200" algn="l"/>
               </a:tabLst>
             </a:pPr>
-            <a:r>
-              <a:rPr lang="en-CH" sz="1600" kern="100" dirty="0">
-                <a:solidFill>
-                  <a:schemeClr val="tx1"/>
-                </a:solidFill>
-                <a:effectLst/>
-                <a:ea typeface="Aptos" panose="020B0004020202020204" pitchFamily="34" charset="0"/>
-                <a:cs typeface="Times New Roman" panose="02020603050405020304" pitchFamily="18" charset="0"/>
-              </a:rPr>
-              <a:t>Implement </a:t>
-            </a:r>
-            <a:r>
-              <a:rPr lang="en-CH" sz="1600" kern="100" dirty="0" err="1">
-                <a:solidFill>
-                  <a:schemeClr val="tx1"/>
-                </a:solidFill>
-                <a:effectLst/>
-                <a:ea typeface="Aptos" panose="020B0004020202020204" pitchFamily="34" charset="0"/>
-                <a:cs typeface="Times New Roman" panose="02020603050405020304" pitchFamily="18" charset="0"/>
-              </a:rPr>
-              <a:t>ResNet</a:t>
-            </a:r>
-            <a:r>
-              <a:rPr lang="en-CH" sz="1600" kern="100" dirty="0">
-                <a:solidFill>
-                  <a:schemeClr val="tx1"/>
-                </a:solidFill>
-                <a:effectLst/>
-                <a:ea typeface="Aptos" panose="020B0004020202020204" pitchFamily="34" charset="0"/>
-                <a:cs typeface="Times New Roman" panose="02020603050405020304" pitchFamily="18" charset="0"/>
-              </a:rPr>
-              <a:t> for transfer learning to enhance feature extraction and accuracy.</a:t>
-            </a:r>
-          </a:p>
-          <a:p>
-            <a:pPr marL="342900" lvl="0" indent="-342900">
+            <a:endParaRPr lang="en-GB" sz="1600" kern="100" dirty="0">
+              <a:solidFill>
+                <a:schemeClr val="tx1"/>
+              </a:solidFill>
+              <a:effectLst/>
+              <a:ea typeface="Aptos" panose="020B0004020202020204" pitchFamily="34" charset="0"/>
+              <a:cs typeface="Times New Roman" panose="02020603050405020304" pitchFamily="18" charset="0"/>
+            </a:endParaRPr>
+          </a:p>
+          <a:p>
+            <a:pPr marL="285750" lvl="0" indent="-285750">
               <a:lnSpc>
                 <a:spcPct val="115000"/>
               </a:lnSpc>
@@ -7550,26 +7537,23 @@
                 <a:spcPts val="800"/>
               </a:spcAft>
               <a:buSzPts val="1000"/>
-              <a:buFont typeface="Symbol" panose="05050102010706020507" pitchFamily="18" charset="2"/>
-              <a:buChar char=""/>
+              <a:buFont typeface="Arial" panose="020B0604020202020204" pitchFamily="34" charset="0"/>
+              <a:buChar char="•"/>
               <a:tabLst>
                 <a:tab pos="457200" algn="l"/>
               </a:tabLst>
             </a:pPr>
-            <a:r>
-              <a:rPr lang="en-CH" sz="1600" kern="100" dirty="0">
-                <a:solidFill>
-                  <a:schemeClr val="tx1"/>
-                </a:solidFill>
-                <a:effectLst/>
-                <a:ea typeface="Aptos" panose="020B0004020202020204" pitchFamily="34" charset="0"/>
-                <a:cs typeface="Times New Roman" panose="02020603050405020304" pitchFamily="18" charset="0"/>
-              </a:rPr>
-              <a:t>Fine-tune learning rate and explore further data augmentation techniques.</a:t>
-            </a:r>
-          </a:p>
-          <a:p>
-            <a:pPr marL="342900" lvl="0" indent="-342900">
+            <a:endParaRPr lang="en-GB" sz="1600" kern="100" dirty="0">
+              <a:solidFill>
+                <a:schemeClr val="tx1"/>
+              </a:solidFill>
+              <a:effectLst/>
+              <a:ea typeface="Aptos" panose="020B0004020202020204" pitchFamily="34" charset="0"/>
+              <a:cs typeface="Times New Roman" panose="02020603050405020304" pitchFamily="18" charset="0"/>
+            </a:endParaRPr>
+          </a:p>
+          <a:p>
+            <a:pPr marL="285750" lvl="0" indent="-285750">
               <a:lnSpc>
                 <a:spcPct val="115000"/>
               </a:lnSpc>
@@ -7577,25 +7561,12 @@
                 <a:spcPts val="800"/>
               </a:spcAft>
               <a:buSzPts val="1000"/>
-              <a:buFont typeface="Symbol" panose="05050102010706020507" pitchFamily="18" charset="2"/>
-              <a:buChar char=""/>
+              <a:buFont typeface="Arial" panose="020B0604020202020204" pitchFamily="34" charset="0"/>
+              <a:buChar char="•"/>
               <a:tabLst>
                 <a:tab pos="457200" algn="l"/>
               </a:tabLst>
             </a:pPr>
-            <a:r>
-              <a:rPr lang="en-CH" sz="1600" kern="100" dirty="0">
-                <a:solidFill>
-                  <a:schemeClr val="tx1"/>
-                </a:solidFill>
-                <a:effectLst/>
-                <a:ea typeface="Aptos" panose="020B0004020202020204" pitchFamily="34" charset="0"/>
-                <a:cs typeface="Times New Roman" panose="02020603050405020304" pitchFamily="18" charset="0"/>
-              </a:rPr>
-              <a:t>Address class imbalance using techniques like weighted loss functions or oversampling.</a:t>
-            </a:r>
-          </a:p>
-          <a:p>
             <a:endParaRPr lang="en-GB" sz="2000" dirty="0">
               <a:solidFill>
                 <a:schemeClr val="tx1"/>
@@ -7604,6 +7575,143 @@
           </a:p>
         </p:txBody>
       </p:sp>
+      <p:graphicFrame>
+        <p:nvGraphicFramePr>
+          <p:cNvPr id="6" name="Table 5">
+            <a:extLst>
+              <a:ext uri="{FF2B5EF4-FFF2-40B4-BE49-F238E27FC236}">
+                <a16:creationId xmlns:a16="http://schemas.microsoft.com/office/drawing/2014/main" id="{FD7E6E78-4D76-6286-E8E6-4385CB4BFA12}"/>
+              </a:ext>
+            </a:extLst>
+          </p:cNvPr>
+          <p:cNvGraphicFramePr>
+            <a:graphicFrameLocks noGrp="1"/>
+          </p:cNvGraphicFramePr>
+          <p:nvPr>
+            <p:extLst>
+              <p:ext uri="{D42A27DB-BD31-4B8C-83A1-F6EECF244321}">
+                <p14:modId xmlns:p14="http://schemas.microsoft.com/office/powerpoint/2010/main" val="2268205427"/>
+              </p:ext>
+            </p:extLst>
+          </p:nvPr>
+        </p:nvGraphicFramePr>
+        <p:xfrm>
+          <a:off x="971155" y="3713888"/>
+          <a:ext cx="8406876" cy="365760"/>
+        </p:xfrm>
+        <a:graphic>
+          <a:graphicData uri="http://schemas.openxmlformats.org/drawingml/2006/table">
+            <a:tbl>
+              <a:tblPr firstRow="1" bandRow="1">
+                <a:tableStyleId>{2D5ABB26-0587-4C30-8999-92F81FD0307C}</a:tableStyleId>
+              </a:tblPr>
+              <a:tblGrid>
+                <a:gridCol w="4203438">
+                  <a:extLst>
+                    <a:ext uri="{9D8B030D-6E8A-4147-A177-3AD203B41FA5}">
+                      <a16:colId xmlns:a16="http://schemas.microsoft.com/office/drawing/2014/main" val="349167990"/>
+                    </a:ext>
+                  </a:extLst>
+                </a:gridCol>
+                <a:gridCol w="4203438">
+                  <a:extLst>
+                    <a:ext uri="{9D8B030D-6E8A-4147-A177-3AD203B41FA5}">
+                      <a16:colId xmlns:a16="http://schemas.microsoft.com/office/drawing/2014/main" val="3106607662"/>
+                    </a:ext>
+                  </a:extLst>
+                </a:gridCol>
+              </a:tblGrid>
+              <a:tr h="0">
+                <a:tc>
+                  <a:txBody>
+                    <a:bodyPr/>
+                    <a:lstStyle/>
+                    <a:p>
+                      <a:endParaRPr lang="en-CH" dirty="0"/>
+                    </a:p>
+                  </a:txBody>
+                  <a:tcPr/>
+                </a:tc>
+                <a:tc>
+                  <a:txBody>
+                    <a:bodyPr/>
+                    <a:lstStyle/>
+                    <a:p>
+                      <a:endParaRPr lang="en-CH" dirty="0"/>
+                    </a:p>
+                  </a:txBody>
+                  <a:tcPr/>
+                </a:tc>
+                <a:extLst>
+                  <a:ext uri="{0D108BD9-81ED-4DB2-BD59-A6C34878D82A}">
+                    <a16:rowId xmlns:a16="http://schemas.microsoft.com/office/drawing/2014/main" val="2221006103"/>
+                  </a:ext>
+                </a:extLst>
+              </a:tr>
+            </a:tbl>
+          </a:graphicData>
+        </a:graphic>
+      </p:graphicFrame>
+      <p:pic>
+        <p:nvPicPr>
+          <p:cNvPr id="8" name="Picture 7" descr="A blue squares with white text">
+            <a:extLst>
+              <a:ext uri="{FF2B5EF4-FFF2-40B4-BE49-F238E27FC236}">
+                <a16:creationId xmlns:a16="http://schemas.microsoft.com/office/drawing/2014/main" id="{460C22AC-7882-8400-6A29-87354F76A87F}"/>
+              </a:ext>
+            </a:extLst>
+          </p:cNvPr>
+          <p:cNvPicPr>
+            <a:picLocks noChangeAspect="1"/>
+          </p:cNvPicPr>
+          <p:nvPr/>
+        </p:nvPicPr>
+        <p:blipFill>
+          <a:blip r:embed="rId2"/>
+          <a:stretch>
+            <a:fillRect/>
+          </a:stretch>
+        </p:blipFill>
+        <p:spPr>
+          <a:xfrm>
+            <a:off x="781970" y="3590359"/>
+            <a:ext cx="3960297" cy="3168239"/>
+          </a:xfrm>
+          <a:prstGeom prst="rect">
+            <a:avLst/>
+          </a:prstGeom>
+        </p:spPr>
+      </p:pic>
+      <p:pic>
+        <p:nvPicPr>
+          <p:cNvPr id="10" name="Picture 9" descr="A graph with numbers and lines&#10;&#10;Description automatically generated">
+            <a:extLst>
+              <a:ext uri="{FF2B5EF4-FFF2-40B4-BE49-F238E27FC236}">
+                <a16:creationId xmlns:a16="http://schemas.microsoft.com/office/drawing/2014/main" id="{980CA017-2FDB-57FE-E7D7-08D95CDB8964}"/>
+              </a:ext>
+            </a:extLst>
+          </p:cNvPr>
+          <p:cNvPicPr>
+            <a:picLocks noChangeAspect="1"/>
+          </p:cNvPicPr>
+          <p:nvPr/>
+        </p:nvPicPr>
+        <p:blipFill>
+          <a:blip r:embed="rId3"/>
+          <a:stretch>
+            <a:fillRect/>
+          </a:stretch>
+        </p:blipFill>
+        <p:spPr>
+          <a:xfrm>
+            <a:off x="4931452" y="3590359"/>
+            <a:ext cx="6331356" cy="2110452"/>
+          </a:xfrm>
+          <a:prstGeom prst="rect">
+            <a:avLst/>
+          </a:prstGeom>
+        </p:spPr>
+      </p:pic>
     </p:spTree>
     <p:extLst>
       <p:ext uri="{BB962C8B-B14F-4D97-AF65-F5344CB8AC3E}">
@@ -7698,8 +7806,8 @@
         </p:nvSpPr>
         <p:spPr>
           <a:xfrm>
-            <a:off x="744082" y="1541446"/>
-            <a:ext cx="10196061" cy="5060739"/>
+            <a:off x="744083" y="1541446"/>
+            <a:ext cx="10152518" cy="5643125"/>
           </a:xfrm>
         </p:spPr>
         <p:txBody>
@@ -7717,7 +7825,7 @@
               </a:spcAft>
             </a:pPr>
             <a:r>
-              <a:rPr lang="en-CH" sz="1400" b="1" kern="100" dirty="0">
+              <a:rPr lang="en-GB" sz="2200" b="1" kern="100" dirty="0">
                 <a:solidFill>
                   <a:schemeClr val="tx1"/>
                 </a:solidFill>
@@ -7725,16 +7833,30 @@
                 <a:ea typeface="Aptos" panose="020B0004020202020204" pitchFamily="34" charset="0"/>
                 <a:cs typeface="Times New Roman" panose="02020603050405020304" pitchFamily="18" charset="0"/>
               </a:rPr>
-              <a:t>Segmentation Attempt Using DeepLabV3</a:t>
-            </a:r>
-            <a:endParaRPr lang="en-GB" sz="1400" b="1" kern="100" dirty="0">
-              <a:solidFill>
-                <a:schemeClr val="tx1"/>
-              </a:solidFill>
-              <a:effectLst/>
-              <a:ea typeface="Aptos" panose="020B0004020202020204" pitchFamily="34" charset="0"/>
-              <a:cs typeface="Times New Roman" panose="02020603050405020304" pitchFamily="18" charset="0"/>
-            </a:endParaRPr>
+              <a:t>Learning from </a:t>
+            </a:r>
+            <a:r>
+              <a:rPr lang="en-GB" sz="2200" b="1" kern="100" dirty="0" err="1">
+                <a:solidFill>
+                  <a:schemeClr val="tx1"/>
+                </a:solidFill>
+                <a:effectLst/>
+                <a:ea typeface="Aptos" panose="020B0004020202020204" pitchFamily="34" charset="0"/>
+                <a:cs typeface="Times New Roman" panose="02020603050405020304" pitchFamily="18" charset="0"/>
+              </a:rPr>
+              <a:t>ResNet</a:t>
+            </a:r>
+            <a:r>
+              <a:rPr lang="en-GB" sz="2200" b="1" kern="100" dirty="0">
+                <a:solidFill>
+                  <a:schemeClr val="tx1"/>
+                </a:solidFill>
+                <a:effectLst/>
+                <a:ea typeface="Aptos" panose="020B0004020202020204" pitchFamily="34" charset="0"/>
+                <a:cs typeface="Times New Roman" panose="02020603050405020304" pitchFamily="18" charset="0"/>
+              </a:rPr>
+              <a:t> and Segmentation Attempts</a:t>
+            </a:r>
           </a:p>
           <a:p>
             <a:pPr>
@@ -7745,360 +7867,399 @@
                 <a:spcPts val="800"/>
               </a:spcAft>
             </a:pPr>
-            <a:r>
-              <a:rPr lang="en-GB" sz="1400" b="1" dirty="0">
-                <a:solidFill>
-                  <a:schemeClr val="tx1"/>
-                </a:solidFill>
-              </a:rPr>
-              <a:t>Why Segmentation?</a:t>
-            </a:r>
-            <a:r>
-              <a:rPr lang="en-GB" sz="1400" dirty="0">
-                <a:solidFill>
-                  <a:schemeClr val="tx1"/>
-                </a:solidFill>
-              </a:rPr>
-              <a:t>: </a:t>
-            </a:r>
-            <a:r>
-              <a:rPr lang="en-GB" sz="1200" dirty="0">
-                <a:solidFill>
-                  <a:schemeClr val="tx1"/>
-                </a:solidFill>
-              </a:rPr>
-              <a:t>Segmentation provides pixel-level classification, enabling detailed analysis of greenery distribution in urban images. In the absence of ground truth labels, pre-trained models like DeepLabV3 are used to generate segmentation masks.</a:t>
-            </a:r>
-          </a:p>
-          <a:p>
-            <a:pPr lvl="0">
+            <a:endParaRPr lang="en-GB" sz="200" b="1" kern="100" dirty="0">
+              <a:solidFill>
+                <a:schemeClr val="tx1"/>
+              </a:solidFill>
+              <a:effectLst/>
+              <a:ea typeface="Aptos" panose="020B0004020202020204" pitchFamily="34" charset="0"/>
+              <a:cs typeface="Times New Roman" panose="02020603050405020304" pitchFamily="18" charset="0"/>
+            </a:endParaRPr>
+          </a:p>
+          <a:p>
+            <a:pPr>
               <a:lnSpc>
                 <a:spcPct val="115000"/>
               </a:lnSpc>
               <a:spcAft>
                 <a:spcPts val="800"/>
               </a:spcAft>
-              <a:buSzPts val="1000"/>
-              <a:tabLst>
-                <a:tab pos="457200" algn="l"/>
-              </a:tabLst>
             </a:pPr>
             <a:r>
-              <a:rPr lang="en-CH" sz="1400" b="1" kern="100" dirty="0">
-                <a:solidFill>
-                  <a:schemeClr val="tx1"/>
-                </a:solidFill>
+              <a:rPr lang="en-GB" sz="1600" b="1" kern="100" dirty="0" err="1">
+                <a:solidFill>
+                  <a:schemeClr val="tx1"/>
+                </a:solidFill>
+                <a:effectLst/>
+                <a:ea typeface="Aptos" panose="020B0004020202020204" pitchFamily="34" charset="0"/>
                 <a:cs typeface="Times New Roman" panose="02020603050405020304" pitchFamily="18" charset="0"/>
               </a:rPr>
-              <a:t>Initial Steps:</a:t>
-            </a:r>
-          </a:p>
-          <a:p>
-            <a:pPr marL="742950" lvl="1" indent="-285750" algn="l">
+              <a:t>ResNet</a:t>
+            </a:r>
+            <a:r>
+              <a:rPr lang="en-GB" sz="1600" b="1" kern="100" dirty="0">
+                <a:solidFill>
+                  <a:schemeClr val="tx1"/>
+                </a:solidFill>
+                <a:effectLst/>
+                <a:ea typeface="Aptos" panose="020B0004020202020204" pitchFamily="34" charset="0"/>
+                <a:cs typeface="Times New Roman" panose="02020603050405020304" pitchFamily="18" charset="0"/>
+              </a:rPr>
+              <a:t> Transfer Learning:</a:t>
+            </a:r>
+          </a:p>
+          <a:p>
+            <a:pPr>
               <a:lnSpc>
                 <a:spcPct val="115000"/>
               </a:lnSpc>
               <a:spcAft>
                 <a:spcPts val="800"/>
               </a:spcAft>
-              <a:buSzPts val="1000"/>
-              <a:buFont typeface="Courier New" panose="02070309020205020404" pitchFamily="49" charset="0"/>
-              <a:buChar char="o"/>
-              <a:tabLst>
-                <a:tab pos="914400" algn="l"/>
-              </a:tabLst>
             </a:pPr>
-            <a:r>
-              <a:rPr lang="en-GB" sz="1400" kern="100" dirty="0">
-                <a:solidFill>
-                  <a:schemeClr val="tx1"/>
-                </a:solidFill>
-                <a:cs typeface="Times New Roman" panose="02020603050405020304" pitchFamily="18" charset="0"/>
-              </a:rPr>
-              <a:t>Attempted to generate masks using HSV Filtering, challenge is to adapt the code to various land types.</a:t>
-            </a:r>
-          </a:p>
-          <a:p>
-            <a:pPr marL="742950" lvl="1" indent="-285750" algn="l">
+            <a:endParaRPr lang="en-GB" sz="200" b="1" kern="100" dirty="0">
+              <a:solidFill>
+                <a:schemeClr val="tx1"/>
+              </a:solidFill>
+              <a:effectLst/>
+              <a:ea typeface="Aptos" panose="020B0004020202020204" pitchFamily="34" charset="0"/>
+              <a:cs typeface="Times New Roman" panose="02020603050405020304" pitchFamily="18" charset="0"/>
+            </a:endParaRPr>
+          </a:p>
+          <a:p>
+            <a:pPr marL="285750" indent="-285750">
               <a:lnSpc>
                 <a:spcPct val="115000"/>
               </a:lnSpc>
               <a:spcAft>
                 <a:spcPts val="800"/>
               </a:spcAft>
-              <a:buSzPts val="1000"/>
-              <a:buFont typeface="Courier New" panose="02070309020205020404" pitchFamily="49" charset="0"/>
-              <a:buChar char="o"/>
-              <a:tabLst>
-                <a:tab pos="914400" algn="l"/>
-              </a:tabLst>
+              <a:buFont typeface="Arial" panose="020B0604020202020204" pitchFamily="34" charset="0"/>
+              <a:buChar char="•"/>
             </a:pPr>
             <a:r>
-              <a:rPr lang="en-CH" sz="1400" kern="100" dirty="0">
-                <a:solidFill>
-                  <a:schemeClr val="tx1"/>
-                </a:solidFill>
+              <a:rPr lang="en-GB" sz="1200" kern="100" dirty="0">
+                <a:solidFill>
+                  <a:schemeClr val="tx1"/>
+                </a:solidFill>
+                <a:effectLst/>
+                <a:ea typeface="Aptos" panose="020B0004020202020204" pitchFamily="34" charset="0"/>
                 <a:cs typeface="Times New Roman" panose="02020603050405020304" pitchFamily="18" charset="0"/>
               </a:rPr>
-              <a:t>Generated segmentation masks using DeepLabV3.</a:t>
-            </a:r>
-            <a:endParaRPr lang="en-GB" sz="1400" kern="100" dirty="0">
-              <a:solidFill>
-                <a:schemeClr val="tx1"/>
-              </a:solidFill>
-              <a:cs typeface="Times New Roman" panose="02020603050405020304" pitchFamily="18" charset="0"/>
-            </a:endParaRPr>
-          </a:p>
-          <a:p>
-            <a:pPr marL="742950" lvl="1" indent="-285750" algn="l">
+              <a:t>Efforts: Used pre-trained </a:t>
+            </a:r>
+            <a:r>
+              <a:rPr lang="en-GB" sz="1200" kern="100" dirty="0" err="1">
+                <a:solidFill>
+                  <a:schemeClr val="tx1"/>
+                </a:solidFill>
+                <a:effectLst/>
+                <a:ea typeface="Aptos" panose="020B0004020202020204" pitchFamily="34" charset="0"/>
+                <a:cs typeface="Times New Roman" panose="02020603050405020304" pitchFamily="18" charset="0"/>
+              </a:rPr>
+              <a:t>ResNet</a:t>
+            </a:r>
+            <a:r>
+              <a:rPr lang="en-GB" sz="1200" kern="100" dirty="0">
+                <a:solidFill>
+                  <a:schemeClr val="tx1"/>
+                </a:solidFill>
+                <a:effectLst/>
+                <a:ea typeface="Aptos" panose="020B0004020202020204" pitchFamily="34" charset="0"/>
+                <a:cs typeface="Times New Roman" panose="02020603050405020304" pitchFamily="18" charset="0"/>
+              </a:rPr>
+              <a:t> to improve multi-class classification.</a:t>
+            </a:r>
+          </a:p>
+          <a:p>
+            <a:pPr marL="285750" indent="-285750">
               <a:lnSpc>
                 <a:spcPct val="115000"/>
               </a:lnSpc>
               <a:spcAft>
                 <a:spcPts val="800"/>
               </a:spcAft>
-              <a:buSzPts val="1000"/>
-              <a:buFont typeface="Courier New" panose="02070309020205020404" pitchFamily="49" charset="0"/>
-              <a:buChar char="o"/>
-              <a:tabLst>
-                <a:tab pos="914400" algn="l"/>
-              </a:tabLst>
+              <a:buFont typeface="Arial" panose="020B0604020202020204" pitchFamily="34" charset="0"/>
+              <a:buChar char="•"/>
             </a:pPr>
             <a:r>
-              <a:rPr lang="en-CH" sz="1400" kern="100" dirty="0">
-                <a:solidFill>
-                  <a:schemeClr val="tx1"/>
-                </a:solidFill>
+              <a:rPr lang="en-GB" sz="1200" kern="100" dirty="0">
+                <a:solidFill>
+                  <a:schemeClr val="tx1"/>
+                </a:solidFill>
+                <a:effectLst/>
+                <a:ea typeface="Aptos" panose="020B0004020202020204" pitchFamily="34" charset="0"/>
                 <a:cs typeface="Times New Roman" panose="02020603050405020304" pitchFamily="18" charset="0"/>
               </a:rPr>
-              <a:t>Split masks into Train, Val, and Test folders.</a:t>
-            </a:r>
-          </a:p>
-          <a:p>
-            <a:pPr marL="342900" lvl="0" indent="-342900">
+              <a:t>Outcome: No significant improvement compared to the baseline CNN.</a:t>
+            </a:r>
+          </a:p>
+          <a:p>
+            <a:pPr marL="285750" indent="-285750">
               <a:lnSpc>
                 <a:spcPct val="115000"/>
               </a:lnSpc>
               <a:spcAft>
                 <a:spcPts val="800"/>
               </a:spcAft>
-              <a:buSzPts val="1000"/>
-              <a:buFont typeface="Symbol" panose="05050102010706020507" pitchFamily="18" charset="2"/>
-              <a:buChar char=""/>
-              <a:tabLst>
-                <a:tab pos="457200" algn="l"/>
-              </a:tabLst>
+              <a:buFont typeface="Arial" panose="020B0604020202020204" pitchFamily="34" charset="0"/>
+              <a:buChar char="•"/>
             </a:pPr>
             <a:r>
-              <a:rPr lang="en-CH" sz="1400" b="1" kern="100" dirty="0">
-                <a:solidFill>
-                  <a:schemeClr val="tx1"/>
-                </a:solidFill>
+              <a:rPr lang="en-GB" sz="1200" kern="100" dirty="0">
+                <a:solidFill>
+                  <a:schemeClr val="tx1"/>
+                </a:solidFill>
+                <a:effectLst/>
+                <a:ea typeface="Aptos" panose="020B0004020202020204" pitchFamily="34" charset="0"/>
                 <a:cs typeface="Times New Roman" panose="02020603050405020304" pitchFamily="18" charset="0"/>
               </a:rPr>
-              <a:t>Evaluation Results:</a:t>
-            </a:r>
-            <a:endParaRPr lang="en-GB" sz="1400" b="1" kern="100" dirty="0">
-              <a:solidFill>
-                <a:schemeClr val="tx1"/>
-              </a:solidFill>
-              <a:cs typeface="Times New Roman" panose="02020603050405020304" pitchFamily="18" charset="0"/>
-            </a:endParaRPr>
-          </a:p>
-          <a:p>
-            <a:pPr marL="628650" lvl="1" indent="-171450" algn="l">
+              <a:t>Learning: Complex models require better feature separation in data to yield meaningful results.</a:t>
+            </a:r>
+          </a:p>
+          <a:p>
+            <a:pPr>
               <a:lnSpc>
                 <a:spcPct val="115000"/>
               </a:lnSpc>
               <a:spcAft>
                 <a:spcPts val="800"/>
               </a:spcAft>
-              <a:buSzPts val="1000"/>
-              <a:buFont typeface="Arial" panose="020B0604020202020204" pitchFamily="34" charset="0"/>
-              <a:buChar char="•"/>
-              <a:tabLst>
-                <a:tab pos="457200" algn="l"/>
-              </a:tabLst>
             </a:pPr>
-            <a:r>
-              <a:rPr lang="en-CH" sz="1400" kern="100" dirty="0">
-                <a:solidFill>
-                  <a:schemeClr val="tx1"/>
-                </a:solidFill>
-                <a:cs typeface="Times New Roman" panose="02020603050405020304" pitchFamily="18" charset="0"/>
-              </a:rPr>
-              <a:t>Segmentation output lacked meaningful greenery detection.</a:t>
-            </a:r>
-            <a:endParaRPr lang="en-GB" sz="1400" kern="100" dirty="0">
+            <a:endParaRPr lang="en-GB" sz="200" kern="100" dirty="0">
               <a:solidFill>
                 <a:schemeClr val="tx1"/>
               </a:solidFill>
+              <a:effectLst/>
+              <a:ea typeface="Aptos" panose="020B0004020202020204" pitchFamily="34" charset="0"/>
               <a:cs typeface="Times New Roman" panose="02020603050405020304" pitchFamily="18" charset="0"/>
             </a:endParaRPr>
           </a:p>
           <a:p>
-            <a:pPr marL="628650" lvl="1" indent="-171450" algn="l">
+            <a:pPr>
               <a:lnSpc>
                 <a:spcPct val="115000"/>
               </a:lnSpc>
               <a:spcAft>
                 <a:spcPts val="800"/>
               </a:spcAft>
-              <a:buSzPts val="1000"/>
-              <a:buFont typeface="Arial" panose="020B0604020202020204" pitchFamily="34" charset="0"/>
-              <a:buChar char="•"/>
-              <a:tabLst>
-                <a:tab pos="457200" algn="l"/>
-              </a:tabLst>
             </a:pPr>
             <a:r>
-              <a:rPr lang="en-CH" sz="1400" kern="100" dirty="0">
-                <a:solidFill>
-                  <a:schemeClr val="tx1"/>
-                </a:solidFill>
+              <a:rPr lang="en-GB" sz="1600" b="1" kern="100" dirty="0">
+                <a:solidFill>
+                  <a:schemeClr val="tx1"/>
+                </a:solidFill>
+                <a:effectLst/>
+                <a:ea typeface="Aptos" panose="020B0004020202020204" pitchFamily="34" charset="0"/>
                 <a:cs typeface="Times New Roman" panose="02020603050405020304" pitchFamily="18" charset="0"/>
               </a:rPr>
-              <a:t>Masks predominantly appeared as black regions, indicating poor segmentation quality.</a:t>
-            </a:r>
-          </a:p>
-          <a:p>
-            <a:pPr marL="342900" lvl="0" indent="-342900">
+              <a:t>Segmentation with DeepLabV3:</a:t>
+            </a:r>
+          </a:p>
+          <a:p>
+            <a:pPr>
               <a:lnSpc>
                 <a:spcPct val="115000"/>
               </a:lnSpc>
               <a:spcAft>
                 <a:spcPts val="800"/>
               </a:spcAft>
-              <a:buSzPts val="1000"/>
-              <a:buFont typeface="Symbol" panose="05050102010706020507" pitchFamily="18" charset="2"/>
-              <a:buChar char=""/>
-              <a:tabLst>
-                <a:tab pos="457200" algn="l"/>
-              </a:tabLst>
             </a:pPr>
-            <a:r>
-              <a:rPr lang="en-CH" sz="1400" b="1" kern="100" dirty="0">
-                <a:solidFill>
-                  <a:schemeClr val="tx1"/>
-                </a:solidFill>
-                <a:cs typeface="Times New Roman" panose="02020603050405020304" pitchFamily="18" charset="0"/>
-              </a:rPr>
-              <a:t>Observation</a:t>
-            </a:r>
-            <a:r>
-              <a:rPr lang="en-CH" sz="1400" kern="100" dirty="0">
-                <a:solidFill>
-                  <a:schemeClr val="tx1"/>
-                </a:solidFill>
-                <a:cs typeface="Times New Roman" panose="02020603050405020304" pitchFamily="18" charset="0"/>
-              </a:rPr>
-              <a:t>:</a:t>
-            </a:r>
-            <a:r>
-              <a:rPr lang="en-GB" sz="1400" kern="100" dirty="0">
-                <a:solidFill>
-                  <a:schemeClr val="tx1"/>
-                </a:solidFill>
-                <a:cs typeface="Times New Roman" panose="02020603050405020304" pitchFamily="18" charset="0"/>
-              </a:rPr>
-              <a:t> </a:t>
-            </a:r>
-            <a:r>
-              <a:rPr lang="en-CH" sz="1400" kern="100" dirty="0">
-                <a:solidFill>
-                  <a:schemeClr val="tx1"/>
-                </a:solidFill>
-                <a:cs typeface="Times New Roman" panose="02020603050405020304" pitchFamily="18" charset="0"/>
-              </a:rPr>
-              <a:t>Current approach to segmentation did not yield satisfactory results.</a:t>
-            </a:r>
-          </a:p>
-          <a:p>
-            <a:pPr marL="342900" lvl="0" indent="-342900">
+            <a:endParaRPr lang="en-GB" sz="200" b="1" kern="100" dirty="0">
+              <a:solidFill>
+                <a:schemeClr val="tx1"/>
+              </a:solidFill>
+              <a:effectLst/>
+              <a:ea typeface="Aptos" panose="020B0004020202020204" pitchFamily="34" charset="0"/>
+              <a:cs typeface="Times New Roman" panose="02020603050405020304" pitchFamily="18" charset="0"/>
+            </a:endParaRPr>
+          </a:p>
+          <a:p>
+            <a:pPr>
               <a:lnSpc>
                 <a:spcPct val="115000"/>
               </a:lnSpc>
               <a:spcAft>
                 <a:spcPts val="800"/>
               </a:spcAft>
-              <a:buSzPts val="1000"/>
-              <a:buFont typeface="Symbol" panose="05050102010706020507" pitchFamily="18" charset="2"/>
-              <a:buChar char=""/>
-              <a:tabLst>
-                <a:tab pos="457200" algn="l"/>
-              </a:tabLst>
             </a:pPr>
             <a:r>
-              <a:rPr lang="en-CH" sz="1400" b="1" kern="100" dirty="0">
-                <a:solidFill>
-                  <a:schemeClr val="tx1"/>
-                </a:solidFill>
+              <a:rPr lang="en-GB" sz="1200" kern="100" dirty="0">
+                <a:solidFill>
+                  <a:schemeClr val="tx1"/>
+                </a:solidFill>
+                <a:effectLst/>
+                <a:ea typeface="Aptos" panose="020B0004020202020204" pitchFamily="34" charset="0"/>
                 <a:cs typeface="Times New Roman" panose="02020603050405020304" pitchFamily="18" charset="0"/>
               </a:rPr>
-              <a:t>Future Plans:</a:t>
-            </a:r>
-            <a:endParaRPr lang="en-GB" sz="1400" b="1" kern="100" dirty="0">
-              <a:solidFill>
-                <a:schemeClr val="tx1"/>
-              </a:solidFill>
-              <a:cs typeface="Times New Roman" panose="02020603050405020304" pitchFamily="18" charset="0"/>
-            </a:endParaRPr>
-          </a:p>
-          <a:p>
-            <a:pPr marL="800100" lvl="1" indent="-342900">
+              <a:t>Efforts: Generated segmentation masks to explore greenery detection.</a:t>
+            </a:r>
+          </a:p>
+          <a:p>
+            <a:pPr>
               <a:lnSpc>
                 <a:spcPct val="115000"/>
               </a:lnSpc>
               <a:spcAft>
                 <a:spcPts val="800"/>
               </a:spcAft>
-              <a:buSzPts val="1000"/>
-              <a:buFont typeface="Symbol" panose="05050102010706020507" pitchFamily="18" charset="2"/>
-              <a:buChar char=""/>
-              <a:tabLst>
-                <a:tab pos="457200" algn="l"/>
-              </a:tabLst>
             </a:pPr>
             <a:r>
-              <a:rPr lang="en-CH" sz="1400" kern="100" dirty="0">
-                <a:solidFill>
-                  <a:schemeClr val="tx1"/>
-                </a:solidFill>
+              <a:rPr lang="en-GB" sz="1200" kern="100" dirty="0">
+                <a:solidFill>
+                  <a:schemeClr val="tx1"/>
+                </a:solidFill>
+                <a:effectLst/>
+                <a:ea typeface="Aptos" panose="020B0004020202020204" pitchFamily="34" charset="0"/>
                 <a:cs typeface="Times New Roman" panose="02020603050405020304" pitchFamily="18" charset="0"/>
               </a:rPr>
-              <a:t>Improve segmentation techniques after achieving solid classification results.</a:t>
-            </a:r>
-            <a:endParaRPr lang="en-GB" sz="1400" kern="100" dirty="0">
-              <a:solidFill>
-                <a:schemeClr val="tx1"/>
-              </a:solidFill>
-              <a:cs typeface="Times New Roman" panose="02020603050405020304" pitchFamily="18" charset="0"/>
-            </a:endParaRPr>
-          </a:p>
-          <a:p>
-            <a:pPr marL="800100" lvl="1" indent="-342900">
+              <a:t>Outcome: Segmentation masks were largely black, indicating poor pixel-wise classification.</a:t>
+            </a:r>
+          </a:p>
+          <a:p>
+            <a:pPr>
               <a:lnSpc>
                 <a:spcPct val="115000"/>
               </a:lnSpc>
               <a:spcAft>
                 <a:spcPts val="800"/>
               </a:spcAft>
-              <a:buSzPts val="1000"/>
-              <a:buFont typeface="Symbol" panose="05050102010706020507" pitchFamily="18" charset="2"/>
-              <a:buChar char=""/>
-              <a:tabLst>
-                <a:tab pos="457200" algn="l"/>
-              </a:tabLst>
             </a:pPr>
             <a:r>
-              <a:rPr lang="en-CH" sz="1400" kern="100" dirty="0">
-                <a:solidFill>
-                  <a:schemeClr val="tx1"/>
-                </a:solidFill>
+              <a:rPr lang="en-GB" sz="1200" kern="100" dirty="0">
+                <a:solidFill>
+                  <a:schemeClr val="tx1"/>
+                </a:solidFill>
+                <a:effectLst/>
+                <a:ea typeface="Aptos" panose="020B0004020202020204" pitchFamily="34" charset="0"/>
                 <a:cs typeface="Times New Roman" panose="02020603050405020304" pitchFamily="18" charset="0"/>
               </a:rPr>
-              <a:t>Explore advanced models and refined preprocessing for better segmentation outcomes.</a:t>
-            </a:r>
+              <a:t>Learning: Challenges in adapting pre-trained segmentation models without </a:t>
+            </a:r>
+            <a:r>
+              <a:rPr lang="en-GB" sz="1200" kern="100" dirty="0" err="1">
+                <a:solidFill>
+                  <a:schemeClr val="tx1"/>
+                </a:solidFill>
+                <a:effectLst/>
+                <a:ea typeface="Aptos" panose="020B0004020202020204" pitchFamily="34" charset="0"/>
+                <a:cs typeface="Times New Roman" panose="02020603050405020304" pitchFamily="18" charset="0"/>
+              </a:rPr>
+              <a:t>labeled</a:t>
+            </a:r>
+            <a:r>
+              <a:rPr lang="en-GB" sz="1200" kern="100" dirty="0">
+                <a:solidFill>
+                  <a:schemeClr val="tx1"/>
+                </a:solidFill>
+                <a:effectLst/>
+                <a:ea typeface="Aptos" panose="020B0004020202020204" pitchFamily="34" charset="0"/>
+                <a:cs typeface="Times New Roman" panose="02020603050405020304" pitchFamily="18" charset="0"/>
+              </a:rPr>
+              <a:t> ground truth</a:t>
+            </a:r>
+            <a:r>
+              <a:rPr lang="en-GB" sz="1200" b="1" kern="100" dirty="0">
+                <a:solidFill>
+                  <a:schemeClr val="tx1"/>
+                </a:solidFill>
+                <a:effectLst/>
+                <a:ea typeface="Aptos" panose="020B0004020202020204" pitchFamily="34" charset="0"/>
+                <a:cs typeface="Times New Roman" panose="02020603050405020304" pitchFamily="18" charset="0"/>
+              </a:rPr>
+              <a:t>.</a:t>
+            </a:r>
+          </a:p>
+          <a:p>
+            <a:pPr>
+              <a:lnSpc>
+                <a:spcPct val="115000"/>
+              </a:lnSpc>
+              <a:spcAft>
+                <a:spcPts val="800"/>
+              </a:spcAft>
+            </a:pPr>
+            <a:endParaRPr lang="en-GB" sz="200" b="1" kern="100" dirty="0">
+              <a:solidFill>
+                <a:schemeClr val="tx1"/>
+              </a:solidFill>
+              <a:effectLst/>
+              <a:ea typeface="Aptos" panose="020B0004020202020204" pitchFamily="34" charset="0"/>
+              <a:cs typeface="Times New Roman" panose="02020603050405020304" pitchFamily="18" charset="0"/>
+            </a:endParaRPr>
+          </a:p>
+          <a:p>
+            <a:pPr>
+              <a:lnSpc>
+                <a:spcPct val="115000"/>
+              </a:lnSpc>
+              <a:spcAft>
+                <a:spcPts val="800"/>
+              </a:spcAft>
+            </a:pPr>
+            <a:r>
+              <a:rPr lang="en-GB" sz="1400" b="1" kern="100" dirty="0">
+                <a:solidFill>
+                  <a:schemeClr val="tx1"/>
+                </a:solidFill>
+                <a:effectLst/>
+                <a:ea typeface="Aptos" panose="020B0004020202020204" pitchFamily="34" charset="0"/>
+                <a:cs typeface="Times New Roman" panose="02020603050405020304" pitchFamily="18" charset="0"/>
+              </a:rPr>
+              <a:t>Key Takeaway:</a:t>
+            </a:r>
+          </a:p>
+          <a:p>
+            <a:pPr marL="285750" indent="-285750">
+              <a:lnSpc>
+                <a:spcPct val="115000"/>
+              </a:lnSpc>
+              <a:spcAft>
+                <a:spcPts val="800"/>
+              </a:spcAft>
+              <a:buFont typeface="Arial" panose="020B0604020202020204" pitchFamily="34" charset="0"/>
+              <a:buChar char="•"/>
+            </a:pPr>
+            <a:r>
+              <a:rPr lang="en-GB" sz="1200" kern="100" dirty="0">
+                <a:solidFill>
+                  <a:schemeClr val="tx1"/>
+                </a:solidFill>
+                <a:effectLst/>
+                <a:ea typeface="Aptos" panose="020B0004020202020204" pitchFamily="34" charset="0"/>
+                <a:cs typeface="Times New Roman" panose="02020603050405020304" pitchFamily="18" charset="0"/>
+              </a:rPr>
+              <a:t>Significant insights gained, despite limited success.</a:t>
+            </a:r>
+          </a:p>
+          <a:p>
+            <a:pPr marL="285750" indent="-285750">
+              <a:lnSpc>
+                <a:spcPct val="115000"/>
+              </a:lnSpc>
+              <a:spcAft>
+                <a:spcPts val="800"/>
+              </a:spcAft>
+              <a:buFont typeface="Arial" panose="020B0604020202020204" pitchFamily="34" charset="0"/>
+              <a:buChar char="•"/>
+            </a:pPr>
+            <a:r>
+              <a:rPr lang="en-GB" sz="1200" kern="100" dirty="0">
+                <a:solidFill>
+                  <a:schemeClr val="tx1"/>
+                </a:solidFill>
+                <a:effectLst/>
+                <a:ea typeface="Aptos" panose="020B0004020202020204" pitchFamily="34" charset="0"/>
+                <a:cs typeface="Times New Roman" panose="02020603050405020304" pitchFamily="18" charset="0"/>
+              </a:rPr>
+              <a:t>Simplified tasks (e.g., binary classification) yield more actionable results at this stage.</a:t>
+            </a:r>
+            <a:endParaRPr lang="en-CH" sz="1200" kern="100" dirty="0">
+              <a:solidFill>
+                <a:schemeClr val="tx1"/>
+              </a:solidFill>
+              <a:cs typeface="Times New Roman" panose="02020603050405020304" pitchFamily="18" charset="0"/>
+            </a:endParaRPr>
           </a:p>
           <a:p>
             <a:endParaRPr lang="en-GB" sz="1400" dirty="0">
@@ -8130,7 +8291,7 @@
         <p:cNvPr id="1" name="">
           <a:extLst>
             <a:ext uri="{FF2B5EF4-FFF2-40B4-BE49-F238E27FC236}">
-              <a16:creationId xmlns:a16="http://schemas.microsoft.com/office/drawing/2014/main" id="{534744B2-5F04-CE11-24F2-70BA5DED1EBE}"/>
+              <a16:creationId xmlns:a16="http://schemas.microsoft.com/office/drawing/2014/main" id="{B3E0AA16-C9F8-A1A0-0F35-F25399103D4E}"/>
             </a:ext>
           </a:extLst>
         </p:cNvPr>
@@ -8150,7 +8311,7 @@
           <p:cNvPr id="2" name="Title 1">
             <a:extLst>
               <a:ext uri="{FF2B5EF4-FFF2-40B4-BE49-F238E27FC236}">
-                <a16:creationId xmlns:a16="http://schemas.microsoft.com/office/drawing/2014/main" id="{6C7139E2-CEE8-74EC-54C7-4AB83A10DC72}"/>
+                <a16:creationId xmlns:a16="http://schemas.microsoft.com/office/drawing/2014/main" id="{B5A8208D-1512-CC38-B5BA-5A6AAD6C31C7}"/>
               </a:ext>
             </a:extLst>
           </p:cNvPr>
@@ -8190,7 +8351,7 @@
           <p:cNvPr id="3" name="Subtitle 2">
             <a:extLst>
               <a:ext uri="{FF2B5EF4-FFF2-40B4-BE49-F238E27FC236}">
-                <a16:creationId xmlns:a16="http://schemas.microsoft.com/office/drawing/2014/main" id="{FD04FEE8-FC27-2C66-6FAA-E2D9D4DAAA28}"/>
+                <a16:creationId xmlns:a16="http://schemas.microsoft.com/office/drawing/2014/main" id="{9FA9AC00-7816-C9CA-DDE2-4C2796D5E620}"/>
               </a:ext>
             </a:extLst>
           </p:cNvPr>
@@ -8203,8 +8364,8 @@
         </p:nvSpPr>
         <p:spPr>
           <a:xfrm>
-            <a:off x="744082" y="1541447"/>
-            <a:ext cx="10108975" cy="4662850"/>
+            <a:off x="744083" y="1541446"/>
+            <a:ext cx="10152518" cy="5643125"/>
           </a:xfrm>
         </p:spPr>
         <p:txBody>
@@ -8212,16 +8373,6 @@
             <a:noAutofit/>
           </a:bodyPr>
           <a:lstStyle/>
-          <a:p>
-            <a:endParaRPr lang="en-CH" sz="1600" kern="100" dirty="0">
-              <a:solidFill>
-                <a:schemeClr val="tx1"/>
-              </a:solidFill>
-              <a:effectLst/>
-              <a:ea typeface="Aptos" panose="020B0004020202020204" pitchFamily="34" charset="0"/>
-              <a:cs typeface="Times New Roman" panose="02020603050405020304" pitchFamily="18" charset="0"/>
-            </a:endParaRPr>
-          </a:p>
           <a:p>
             <a:pPr>
               <a:lnSpc>
@@ -8232,7 +8383,7 @@
               </a:spcAft>
             </a:pPr>
             <a:r>
-              <a:rPr lang="en-CH" sz="1600" b="1" dirty="0">
+              <a:rPr lang="en-GB" sz="1800" b="1" kern="100" dirty="0">
                 <a:solidFill>
                   <a:schemeClr val="tx1"/>
                 </a:solidFill>
@@ -8240,9 +8391,323 @@
                 <a:ea typeface="Aptos" panose="020B0004020202020204" pitchFamily="34" charset="0"/>
                 <a:cs typeface="Times New Roman" panose="02020603050405020304" pitchFamily="18" charset="0"/>
               </a:rPr>
-              <a:t>reserved for conclusions and model results.</a:t>
-            </a:r>
-            <a:endParaRPr lang="en-CH" sz="1600" b="1" kern="100" dirty="0">
+              <a:t>Rebuilding Multi-Category Classification</a:t>
+            </a:r>
+          </a:p>
+          <a:p>
+            <a:pPr marL="171450" indent="-171450">
+              <a:lnSpc>
+                <a:spcPct val="115000"/>
+              </a:lnSpc>
+              <a:spcAft>
+                <a:spcPts val="800"/>
+              </a:spcAft>
+              <a:buFont typeface="Arial" panose="020B0604020202020204" pitchFamily="34" charset="0"/>
+              <a:buChar char="•"/>
+            </a:pPr>
+            <a:endParaRPr lang="en-GB" sz="200" kern="100" dirty="0">
+              <a:solidFill>
+                <a:schemeClr val="tx1"/>
+              </a:solidFill>
+              <a:effectLst/>
+              <a:ea typeface="Aptos" panose="020B0004020202020204" pitchFamily="34" charset="0"/>
+              <a:cs typeface="Times New Roman" panose="02020603050405020304" pitchFamily="18" charset="0"/>
+            </a:endParaRPr>
+          </a:p>
+          <a:p>
+            <a:pPr marL="171450" indent="-171450">
+              <a:lnSpc>
+                <a:spcPct val="115000"/>
+              </a:lnSpc>
+              <a:spcAft>
+                <a:spcPts val="800"/>
+              </a:spcAft>
+              <a:buFont typeface="Arial" panose="020B0604020202020204" pitchFamily="34" charset="0"/>
+              <a:buChar char="•"/>
+            </a:pPr>
+            <a:r>
+              <a:rPr lang="en-GB" sz="1600" kern="100" dirty="0">
+                <a:solidFill>
+                  <a:schemeClr val="tx1"/>
+                </a:solidFill>
+                <a:effectLst/>
+                <a:ea typeface="Aptos" panose="020B0004020202020204" pitchFamily="34" charset="0"/>
+                <a:cs typeface="Times New Roman" panose="02020603050405020304" pitchFamily="18" charset="0"/>
+              </a:rPr>
+              <a:t>Explore VGG or similar architectures for clearer feature extraction.</a:t>
+            </a:r>
+          </a:p>
+          <a:p>
+            <a:pPr marL="171450" indent="-171450">
+              <a:lnSpc>
+                <a:spcPct val="115000"/>
+              </a:lnSpc>
+              <a:spcAft>
+                <a:spcPts val="800"/>
+              </a:spcAft>
+              <a:buFont typeface="Arial" panose="020B0604020202020204" pitchFamily="34" charset="0"/>
+              <a:buChar char="•"/>
+            </a:pPr>
+            <a:r>
+              <a:rPr lang="en-GB" sz="1600" kern="100" dirty="0">
+                <a:solidFill>
+                  <a:schemeClr val="tx1"/>
+                </a:solidFill>
+                <a:effectLst/>
+                <a:ea typeface="Aptos" panose="020B0004020202020204" pitchFamily="34" charset="0"/>
+                <a:cs typeface="Times New Roman" panose="02020603050405020304" pitchFamily="18" charset="0"/>
+              </a:rPr>
+              <a:t>Use class weights or balanced datasets to address class imbalance.</a:t>
+            </a:r>
+          </a:p>
+          <a:p>
+            <a:pPr marL="171450" indent="-171450">
+              <a:lnSpc>
+                <a:spcPct val="115000"/>
+              </a:lnSpc>
+              <a:spcAft>
+                <a:spcPts val="800"/>
+              </a:spcAft>
+              <a:buFont typeface="Arial" panose="020B0604020202020204" pitchFamily="34" charset="0"/>
+              <a:buChar char="•"/>
+            </a:pPr>
+            <a:r>
+              <a:rPr lang="en-GB" sz="1600" kern="100" dirty="0">
+                <a:solidFill>
+                  <a:schemeClr val="tx1"/>
+                </a:solidFill>
+                <a:effectLst/>
+                <a:ea typeface="Aptos" panose="020B0004020202020204" pitchFamily="34" charset="0"/>
+                <a:cs typeface="Times New Roman" panose="02020603050405020304" pitchFamily="18" charset="0"/>
+              </a:rPr>
+              <a:t>Experiment with better augmentation strategies (e.g., </a:t>
+            </a:r>
+            <a:r>
+              <a:rPr lang="en-GB" sz="1600" kern="100" dirty="0" err="1">
+                <a:solidFill>
+                  <a:schemeClr val="tx1"/>
+                </a:solidFill>
+                <a:effectLst/>
+                <a:ea typeface="Aptos" panose="020B0004020202020204" pitchFamily="34" charset="0"/>
+                <a:cs typeface="Times New Roman" panose="02020603050405020304" pitchFamily="18" charset="0"/>
+              </a:rPr>
+              <a:t>color</a:t>
+            </a:r>
+            <a:r>
+              <a:rPr lang="en-GB" sz="1600" kern="100" dirty="0">
+                <a:solidFill>
+                  <a:schemeClr val="tx1"/>
+                </a:solidFill>
+                <a:effectLst/>
+                <a:ea typeface="Aptos" panose="020B0004020202020204" pitchFamily="34" charset="0"/>
+                <a:cs typeface="Times New Roman" panose="02020603050405020304" pitchFamily="18" charset="0"/>
+              </a:rPr>
+              <a:t> jitter, blur).</a:t>
+            </a:r>
+          </a:p>
+          <a:p>
+            <a:pPr>
+              <a:lnSpc>
+                <a:spcPct val="115000"/>
+              </a:lnSpc>
+              <a:spcAft>
+                <a:spcPts val="800"/>
+              </a:spcAft>
+            </a:pPr>
+            <a:endParaRPr lang="en-GB" sz="200" kern="100" dirty="0">
+              <a:solidFill>
+                <a:schemeClr val="tx1"/>
+              </a:solidFill>
+              <a:effectLst/>
+              <a:ea typeface="Aptos" panose="020B0004020202020204" pitchFamily="34" charset="0"/>
+              <a:cs typeface="Times New Roman" panose="02020603050405020304" pitchFamily="18" charset="0"/>
+            </a:endParaRPr>
+          </a:p>
+          <a:p>
+            <a:pPr>
+              <a:lnSpc>
+                <a:spcPct val="115000"/>
+              </a:lnSpc>
+              <a:spcAft>
+                <a:spcPts val="800"/>
+              </a:spcAft>
+            </a:pPr>
+            <a:r>
+              <a:rPr lang="en-GB" sz="1800" b="1" kern="100" dirty="0">
+                <a:solidFill>
+                  <a:schemeClr val="tx1"/>
+                </a:solidFill>
+                <a:effectLst/>
+                <a:ea typeface="Aptos" panose="020B0004020202020204" pitchFamily="34" charset="0"/>
+                <a:cs typeface="Times New Roman" panose="02020603050405020304" pitchFamily="18" charset="0"/>
+              </a:rPr>
+              <a:t>Segmentation (Optional Future Work):</a:t>
+            </a:r>
+          </a:p>
+          <a:p>
+            <a:pPr>
+              <a:lnSpc>
+                <a:spcPct val="115000"/>
+              </a:lnSpc>
+              <a:spcAft>
+                <a:spcPts val="800"/>
+              </a:spcAft>
+            </a:pPr>
+            <a:endParaRPr lang="en-GB" sz="200" kern="100" dirty="0">
+              <a:solidFill>
+                <a:schemeClr val="tx1"/>
+              </a:solidFill>
+              <a:effectLst/>
+              <a:ea typeface="Aptos" panose="020B0004020202020204" pitchFamily="34" charset="0"/>
+              <a:cs typeface="Times New Roman" panose="02020603050405020304" pitchFamily="18" charset="0"/>
+            </a:endParaRPr>
+          </a:p>
+          <a:p>
+            <a:pPr marL="285750" indent="-285750">
+              <a:lnSpc>
+                <a:spcPct val="115000"/>
+              </a:lnSpc>
+              <a:spcAft>
+                <a:spcPts val="800"/>
+              </a:spcAft>
+              <a:buFont typeface="Arial" panose="020B0604020202020204" pitchFamily="34" charset="0"/>
+              <a:buChar char="•"/>
+            </a:pPr>
+            <a:r>
+              <a:rPr lang="en-GB" sz="1600" kern="100" dirty="0">
+                <a:solidFill>
+                  <a:schemeClr val="tx1"/>
+                </a:solidFill>
+                <a:effectLst/>
+                <a:ea typeface="Aptos" panose="020B0004020202020204" pitchFamily="34" charset="0"/>
+                <a:cs typeface="Times New Roman" panose="02020603050405020304" pitchFamily="18" charset="0"/>
+              </a:rPr>
+              <a:t>Revisit segmentation only after achieving stable classification performance.</a:t>
+            </a:r>
+          </a:p>
+          <a:p>
+            <a:pPr marL="285750" indent="-285750">
+              <a:lnSpc>
+                <a:spcPct val="115000"/>
+              </a:lnSpc>
+              <a:spcAft>
+                <a:spcPts val="800"/>
+              </a:spcAft>
+              <a:buFont typeface="Arial" panose="020B0604020202020204" pitchFamily="34" charset="0"/>
+              <a:buChar char="•"/>
+            </a:pPr>
+            <a:r>
+              <a:rPr lang="en-GB" sz="1600" kern="100" dirty="0">
+                <a:solidFill>
+                  <a:schemeClr val="tx1"/>
+                </a:solidFill>
+                <a:effectLst/>
+                <a:ea typeface="Aptos" panose="020B0004020202020204" pitchFamily="34" charset="0"/>
+                <a:cs typeface="Times New Roman" panose="02020603050405020304" pitchFamily="18" charset="0"/>
+              </a:rPr>
+              <a:t>Consider </a:t>
+            </a:r>
+            <a:r>
+              <a:rPr lang="en-GB" sz="1600" kern="100" dirty="0" err="1">
+                <a:solidFill>
+                  <a:schemeClr val="tx1"/>
+                </a:solidFill>
+                <a:effectLst/>
+                <a:ea typeface="Aptos" panose="020B0004020202020204" pitchFamily="34" charset="0"/>
+                <a:cs typeface="Times New Roman" panose="02020603050405020304" pitchFamily="18" charset="0"/>
+              </a:rPr>
+              <a:t>labeling</a:t>
+            </a:r>
+            <a:r>
+              <a:rPr lang="en-GB" sz="1600" kern="100" dirty="0">
+                <a:solidFill>
+                  <a:schemeClr val="tx1"/>
+                </a:solidFill>
+                <a:effectLst/>
+                <a:ea typeface="Aptos" panose="020B0004020202020204" pitchFamily="34" charset="0"/>
+                <a:cs typeface="Times New Roman" panose="02020603050405020304" pitchFamily="18" charset="0"/>
+              </a:rPr>
+              <a:t> a small subset of data manually to fine-tune models effectively.</a:t>
+            </a:r>
+          </a:p>
+          <a:p>
+            <a:pPr>
+              <a:lnSpc>
+                <a:spcPct val="115000"/>
+              </a:lnSpc>
+              <a:spcAft>
+                <a:spcPts val="800"/>
+              </a:spcAft>
+            </a:pPr>
+            <a:endParaRPr lang="en-GB" sz="200" kern="100" dirty="0">
+              <a:solidFill>
+                <a:schemeClr val="tx1"/>
+              </a:solidFill>
+              <a:effectLst/>
+              <a:ea typeface="Aptos" panose="020B0004020202020204" pitchFamily="34" charset="0"/>
+              <a:cs typeface="Times New Roman" panose="02020603050405020304" pitchFamily="18" charset="0"/>
+            </a:endParaRPr>
+          </a:p>
+          <a:p>
+            <a:pPr>
+              <a:lnSpc>
+                <a:spcPct val="115000"/>
+              </a:lnSpc>
+              <a:spcAft>
+                <a:spcPts val="800"/>
+              </a:spcAft>
+            </a:pPr>
+            <a:r>
+              <a:rPr lang="en-GB" sz="2200" b="1" u="sng" kern="100" dirty="0">
+                <a:solidFill>
+                  <a:schemeClr val="tx1"/>
+                </a:solidFill>
+                <a:effectLst/>
+                <a:ea typeface="Aptos" panose="020B0004020202020204" pitchFamily="34" charset="0"/>
+                <a:cs typeface="Times New Roman" panose="02020603050405020304" pitchFamily="18" charset="0"/>
+              </a:rPr>
+              <a:t>Goal:</a:t>
+            </a:r>
+          </a:p>
+          <a:p>
+            <a:pPr>
+              <a:lnSpc>
+                <a:spcPct val="115000"/>
+              </a:lnSpc>
+              <a:spcAft>
+                <a:spcPts val="800"/>
+              </a:spcAft>
+            </a:pPr>
+            <a:endParaRPr lang="en-GB" sz="200" kern="100" dirty="0">
+              <a:solidFill>
+                <a:schemeClr val="tx1"/>
+              </a:solidFill>
+              <a:effectLst/>
+              <a:ea typeface="Aptos" panose="020B0004020202020204" pitchFamily="34" charset="0"/>
+              <a:cs typeface="Times New Roman" panose="02020603050405020304" pitchFamily="18" charset="0"/>
+            </a:endParaRPr>
+          </a:p>
+          <a:p>
+            <a:pPr>
+              <a:lnSpc>
+                <a:spcPct val="115000"/>
+              </a:lnSpc>
+              <a:spcAft>
+                <a:spcPts val="800"/>
+              </a:spcAft>
+            </a:pPr>
+            <a:r>
+              <a:rPr lang="en-GB" sz="1800" kern="100" dirty="0">
+                <a:solidFill>
+                  <a:schemeClr val="tx1"/>
+                </a:solidFill>
+                <a:effectLst/>
+                <a:ea typeface="Aptos" panose="020B0004020202020204" pitchFamily="34" charset="0"/>
+                <a:cs typeface="Times New Roman" panose="02020603050405020304" pitchFamily="18" charset="0"/>
+              </a:rPr>
+              <a:t>Achieve strong performance on multi-category classification, addressing challenges faced in earlier attempts.</a:t>
+            </a:r>
+            <a:endParaRPr lang="en-CH" sz="1800" kern="100" dirty="0">
               <a:solidFill>
                 <a:schemeClr val="tx1"/>
               </a:solidFill>
@@ -8250,7 +8715,7 @@
             </a:endParaRPr>
           </a:p>
           <a:p>
-            <a:endParaRPr lang="en-GB" sz="1600" dirty="0">
+            <a:endParaRPr lang="en-GB" sz="1200" dirty="0">
               <a:solidFill>
                 <a:schemeClr val="tx1"/>
               </a:solidFill>
@@ -8261,7 +8726,7 @@
     </p:spTree>
     <p:extLst>
       <p:ext uri="{BB962C8B-B14F-4D97-AF65-F5344CB8AC3E}">
-        <p14:creationId xmlns:p14="http://schemas.microsoft.com/office/powerpoint/2010/main" val="1489757524"/>
+        <p14:creationId xmlns:p14="http://schemas.microsoft.com/office/powerpoint/2010/main" val="3184428157"/>
       </p:ext>
     </p:extLst>
   </p:cSld>

</xml_diff>

<commit_message>
push the projects as of now 2025.01.12 v2
</commit_message>
<xml_diff>
--- a/cas_deepL_project/Eurosat_Image_Classification_Project.pptx
+++ b/cas_deepL_project/Eurosat_Image_Classification_Project.pptx
@@ -313,7 +313,7 @@
             <a:fld id="{B61BEF0D-F0BB-DE4B-95CE-6DB70DBA9567}" type="datetimeFigureOut">
               <a:rPr lang="en-US" dirty="0"/>
               <a:pPr/>
-              <a:t>1/11/2025</a:t>
+              <a:t>1/12/2025</a:t>
             </a:fld>
             <a:endParaRPr lang="en-US" dirty="0"/>
           </a:p>
@@ -746,7 +746,7 @@
             <a:fld id="{B61BEF0D-F0BB-DE4B-95CE-6DB70DBA9567}" type="datetimeFigureOut">
               <a:rPr lang="en-US" dirty="0"/>
               <a:pPr/>
-              <a:t>1/11/2025</a:t>
+              <a:t>1/12/2025</a:t>
             </a:fld>
             <a:endParaRPr lang="en-US" dirty="0"/>
           </a:p>
@@ -993,7 +993,7 @@
             <a:fld id="{B61BEF0D-F0BB-DE4B-95CE-6DB70DBA9567}" type="datetimeFigureOut">
               <a:rPr lang="en-US" dirty="0"/>
               <a:pPr/>
-              <a:t>1/11/2025</a:t>
+              <a:t>1/12/2025</a:t>
             </a:fld>
             <a:endParaRPr lang="en-US" dirty="0"/>
           </a:p>
@@ -1298,7 +1298,7 @@
             <a:fld id="{B61BEF0D-F0BB-DE4B-95CE-6DB70DBA9567}" type="datetimeFigureOut">
               <a:rPr lang="en-US" dirty="0"/>
               <a:pPr/>
-              <a:t>1/11/2025</a:t>
+              <a:t>1/12/2025</a:t>
             </a:fld>
             <a:endParaRPr lang="en-US" dirty="0"/>
           </a:p>
@@ -1613,7 +1613,7 @@
             <a:fld id="{B61BEF0D-F0BB-DE4B-95CE-6DB70DBA9567}" type="datetimeFigureOut">
               <a:rPr lang="en-US" dirty="0"/>
               <a:pPr/>
-              <a:t>1/11/2025</a:t>
+              <a:t>1/12/2025</a:t>
             </a:fld>
             <a:endParaRPr lang="en-US" dirty="0"/>
           </a:p>
@@ -1912,7 +1912,7 @@
             <a:fld id="{B61BEF0D-F0BB-DE4B-95CE-6DB70DBA9567}" type="datetimeFigureOut">
               <a:rPr lang="en-US" dirty="0"/>
               <a:pPr/>
-              <a:t>1/11/2025</a:t>
+              <a:t>1/12/2025</a:t>
             </a:fld>
             <a:endParaRPr lang="en-US" dirty="0"/>
           </a:p>
@@ -2276,7 +2276,7 @@
             <a:fld id="{B61BEF0D-F0BB-DE4B-95CE-6DB70DBA9567}" type="datetimeFigureOut">
               <a:rPr lang="en-US" dirty="0"/>
               <a:pPr/>
-              <a:t>1/11/2025</a:t>
+              <a:t>1/12/2025</a:t>
             </a:fld>
             <a:endParaRPr lang="en-US" dirty="0"/>
           </a:p>
@@ -2447,7 +2447,7 @@
             <a:fld id="{B61BEF0D-F0BB-DE4B-95CE-6DB70DBA9567}" type="datetimeFigureOut">
               <a:rPr lang="en-US" dirty="0"/>
               <a:pPr/>
-              <a:t>1/11/2025</a:t>
+              <a:t>1/12/2025</a:t>
             </a:fld>
             <a:endParaRPr lang="en-US" dirty="0"/>
           </a:p>
@@ -2624,7 +2624,7 @@
             <a:fld id="{B61BEF0D-F0BB-DE4B-95CE-6DB70DBA9567}" type="datetimeFigureOut">
               <a:rPr lang="en-US" dirty="0"/>
               <a:pPr/>
-              <a:t>1/11/2025</a:t>
+              <a:t>1/12/2025</a:t>
             </a:fld>
             <a:endParaRPr lang="en-US" dirty="0"/>
           </a:p>
@@ -2791,7 +2791,7 @@
             <a:fld id="{B61BEF0D-F0BB-DE4B-95CE-6DB70DBA9567}" type="datetimeFigureOut">
               <a:rPr lang="en-US" dirty="0"/>
               <a:pPr/>
-              <a:t>1/11/2025</a:t>
+              <a:t>1/12/2025</a:t>
             </a:fld>
             <a:endParaRPr lang="en-US" dirty="0"/>
           </a:p>
@@ -3038,7 +3038,7 @@
             <a:fld id="{B61BEF0D-F0BB-DE4B-95CE-6DB70DBA9567}" type="datetimeFigureOut">
               <a:rPr lang="en-US" dirty="0"/>
               <a:pPr/>
-              <a:t>1/11/2025</a:t>
+              <a:t>1/12/2025</a:t>
             </a:fld>
             <a:endParaRPr lang="en-US" dirty="0"/>
           </a:p>
@@ -3271,7 +3271,7 @@
             <a:fld id="{B61BEF0D-F0BB-DE4B-95CE-6DB70DBA9567}" type="datetimeFigureOut">
               <a:rPr lang="en-US" dirty="0"/>
               <a:pPr/>
-              <a:t>1/11/2025</a:t>
+              <a:t>1/12/2025</a:t>
             </a:fld>
             <a:endParaRPr lang="en-US" dirty="0"/>
           </a:p>
@@ -3650,7 +3650,7 @@
             <a:fld id="{B61BEF0D-F0BB-DE4B-95CE-6DB70DBA9567}" type="datetimeFigureOut">
               <a:rPr lang="en-US" dirty="0"/>
               <a:pPr/>
-              <a:t>1/11/2025</a:t>
+              <a:t>1/12/2025</a:t>
             </a:fld>
             <a:endParaRPr lang="en-US" dirty="0"/>
           </a:p>
@@ -3765,7 +3765,7 @@
             <a:fld id="{B61BEF0D-F0BB-DE4B-95CE-6DB70DBA9567}" type="datetimeFigureOut">
               <a:rPr lang="en-US" dirty="0"/>
               <a:pPr/>
-              <a:t>1/11/2025</a:t>
+              <a:t>1/12/2025</a:t>
             </a:fld>
             <a:endParaRPr lang="en-US" dirty="0"/>
           </a:p>
@@ -3857,7 +3857,7 @@
             <a:fld id="{B61BEF0D-F0BB-DE4B-95CE-6DB70DBA9567}" type="datetimeFigureOut">
               <a:rPr lang="en-US" dirty="0"/>
               <a:pPr/>
-              <a:t>1/11/2025</a:t>
+              <a:t>1/12/2025</a:t>
             </a:fld>
             <a:endParaRPr lang="en-US" dirty="0"/>
           </a:p>
@@ -4109,7 +4109,7 @@
             <a:fld id="{B61BEF0D-F0BB-DE4B-95CE-6DB70DBA9567}" type="datetimeFigureOut">
               <a:rPr lang="en-US" dirty="0"/>
               <a:pPr/>
-              <a:t>1/11/2025</a:t>
+              <a:t>1/12/2025</a:t>
             </a:fld>
             <a:endParaRPr lang="en-US" dirty="0"/>
           </a:p>
@@ -4389,7 +4389,7 @@
             <a:fld id="{B61BEF0D-F0BB-DE4B-95CE-6DB70DBA9567}" type="datetimeFigureOut">
               <a:rPr lang="en-US" dirty="0"/>
               <a:pPr/>
-              <a:t>1/11/2025</a:t>
+              <a:t>1/12/2025</a:t>
             </a:fld>
             <a:endParaRPr lang="en-US" dirty="0"/>
           </a:p>
@@ -4792,7 +4792,7 @@
             <a:fld id="{B61BEF0D-F0BB-DE4B-95CE-6DB70DBA9567}" type="datetimeFigureOut">
               <a:rPr lang="en-US" dirty="0"/>
               <a:pPr/>
-              <a:t>1/11/2025</a:t>
+              <a:t>1/12/2025</a:t>
             </a:fld>
             <a:endParaRPr lang="en-US" dirty="0"/>
           </a:p>
@@ -5609,9 +5609,61 @@
                 <a:ea typeface="Aptos" panose="020B0004020202020204" pitchFamily="34" charset="0"/>
                 <a:cs typeface="Times New Roman" panose="02020603050405020304" pitchFamily="18" charset="0"/>
               </a:rPr>
+              <a:t>Code can be found at: </a:t>
+            </a:r>
+            <a:r>
+              <a:rPr lang="en-GB" sz="3000" dirty="0">
+                <a:solidFill>
+                  <a:schemeClr val="tx1"/>
+                </a:solidFill>
+                <a:effectLst/>
+                <a:latin typeface="+mj-lt"/>
+                <a:ea typeface="Aptos" panose="020B0004020202020204" pitchFamily="34" charset="0"/>
+                <a:cs typeface="Times New Roman" panose="02020603050405020304" pitchFamily="18" charset="0"/>
+              </a:rPr>
+              <a:t>https://github.com/sadhchanGitHub/data_science_projects/tree/main/cas_deepL_project</a:t>
+            </a:r>
+          </a:p>
+          <a:p>
+            <a:pPr algn="ctr">
+              <a:lnSpc>
+                <a:spcPct val="115000"/>
+              </a:lnSpc>
+              <a:spcAft>
+                <a:spcPts val="800"/>
+              </a:spcAft>
+            </a:pPr>
+            <a:endParaRPr lang="en-GB" sz="3000" b="1" dirty="0">
+              <a:solidFill>
+                <a:schemeClr val="tx1"/>
+              </a:solidFill>
+              <a:latin typeface="+mj-lt"/>
+              <a:ea typeface="Aptos" panose="020B0004020202020204" pitchFamily="34" charset="0"/>
+              <a:cs typeface="Times New Roman" panose="02020603050405020304" pitchFamily="18" charset="0"/>
+            </a:endParaRPr>
+          </a:p>
+          <a:p>
+            <a:pPr algn="ctr">
+              <a:lnSpc>
+                <a:spcPct val="115000"/>
+              </a:lnSpc>
+              <a:spcAft>
+                <a:spcPts val="800"/>
+              </a:spcAft>
+            </a:pPr>
+            <a:r>
+              <a:rPr lang="en-GB" sz="4000" b="1" dirty="0">
+                <a:solidFill>
+                  <a:schemeClr val="tx1"/>
+                </a:solidFill>
+                <a:effectLst/>
+                <a:latin typeface="+mj-lt"/>
+                <a:ea typeface="Aptos" panose="020B0004020202020204" pitchFamily="34" charset="0"/>
+                <a:cs typeface="Times New Roman" panose="02020603050405020304" pitchFamily="18" charset="0"/>
+              </a:rPr>
               <a:t>Thank you</a:t>
             </a:r>
-            <a:endParaRPr lang="en-CH" sz="3000" b="1" kern="100" dirty="0">
+            <a:endParaRPr lang="en-CH" sz="4000" b="1" kern="100" dirty="0">
               <a:solidFill>
                 <a:schemeClr val="tx1"/>
               </a:solidFill>

</xml_diff>